<commit_message>
Ispravka vodica za VS2022
</commit_message>
<xml_diff>
--- a/0. Vodiči/1. Visual Studio 2022 Instalacija.pptx
+++ b/0. Vodiči/1. Visual Studio 2022 Instalacija.pptx
@@ -5,7 +5,7 @@
     <p:sldMasterId id="2147483677" r:id="rId1"/>
   </p:sldMasterIdLst>
   <p:notesMasterIdLst>
-    <p:notesMasterId r:id="rId12"/>
+    <p:notesMasterId r:id="rId14"/>
   </p:notesMasterIdLst>
   <p:sldIdLst>
     <p:sldId id="256" r:id="rId2"/>
@@ -18,6 +18,8 @@
     <p:sldId id="265" r:id="rId9"/>
     <p:sldId id="261" r:id="rId10"/>
     <p:sldId id="266" r:id="rId11"/>
+    <p:sldId id="267" r:id="rId12"/>
+    <p:sldId id="268" r:id="rId13"/>
   </p:sldIdLst>
   <p:sldSz cx="12192000" cy="6858000"/>
   <p:notesSz cx="6858000" cy="9144000"/>
@@ -206,7 +208,7 @@
           <a:p>
             <a:fld id="{51B1573C-E968-4969-A9CC-AF4DC37B41C7}" type="datetimeFigureOut">
               <a:rPr lang="en-US" smtClean="0"/>
-              <a:t>6/11/2022</a:t>
+              <a:t>6/17/2022</a:t>
             </a:fld>
             <a:endParaRPr lang="en-US"/>
           </a:p>
@@ -8014,6 +8016,3364 @@
 </p:sld>
 </file>
 
+<file path=ppt/slides/slide11.xml><?xml version="1.0" encoding="utf-8"?>
+<p:sld xmlns:a="http://schemas.openxmlformats.org/drawingml/2006/main" xmlns:r="http://schemas.openxmlformats.org/officeDocument/2006/relationships" xmlns:p="http://schemas.openxmlformats.org/presentationml/2006/main">
+  <p:cSld>
+    <p:bg>
+      <p:bgPr>
+        <a:solidFill>
+          <a:schemeClr val="bg1"/>
+        </a:solidFill>
+        <a:effectLst/>
+      </p:bgPr>
+    </p:bg>
+    <p:spTree>
+      <p:nvGrpSpPr>
+        <p:cNvPr id="1" name=""/>
+        <p:cNvGrpSpPr/>
+        <p:nvPr/>
+      </p:nvGrpSpPr>
+      <p:grpSpPr>
+        <a:xfrm>
+          <a:off x="0" y="0"/>
+          <a:ext cx="0" cy="0"/>
+          <a:chOff x="0" y="0"/>
+          <a:chExt cx="0" cy="0"/>
+        </a:xfrm>
+      </p:grpSpPr>
+      <p:grpSp>
+        <p:nvGrpSpPr>
+          <p:cNvPr id="13" name="Group 12">
+            <a:extLst>
+              <a:ext uri="{FF2B5EF4-FFF2-40B4-BE49-F238E27FC236}">
+                <a16:creationId xmlns:a16="http://schemas.microsoft.com/office/drawing/2014/main" id="{DDE8DE2B-61C1-46D5-BEB8-521321C182C4}"/>
+              </a:ext>
+              <a:ext uri="{C183D7F6-B498-43B3-948B-1728B52AA6E4}">
+                <adec:decorative xmlns:adec="http://schemas.microsoft.com/office/drawing/2017/decorative" val="1"/>
+              </a:ext>
+            </a:extLst>
+          </p:cNvPr>
+          <p:cNvGrpSpPr>
+            <a:grpSpLocks noGrp="1" noUngrp="1" noRot="1" noChangeAspect="1" noMove="1" noResize="1"/>
+          </p:cNvGrpSpPr>
+          <p:nvPr>
+            <p:extLst>
+              <p:ext uri="{386F3935-93C4-4BCD-93E2-E3B085C9AB24}">
+                <p16:designElem xmlns:p16="http://schemas.microsoft.com/office/powerpoint/2015/main" val="1"/>
+              </p:ext>
+            </p:extLst>
+          </p:nvPr>
+        </p:nvGrpSpPr>
+        <p:grpSpPr>
+          <a:xfrm>
+            <a:off x="0" y="-8467"/>
+            <a:ext cx="12192000" cy="6866467"/>
+            <a:chOff x="0" y="-8467"/>
+            <a:chExt cx="12192000" cy="6866467"/>
+          </a:xfrm>
+        </p:grpSpPr>
+        <p:cxnSp>
+          <p:nvCxnSpPr>
+            <p:cNvPr id="14" name="Straight Connector 13">
+              <a:extLst>
+                <a:ext uri="{FF2B5EF4-FFF2-40B4-BE49-F238E27FC236}">
+                  <a16:creationId xmlns:a16="http://schemas.microsoft.com/office/drawing/2014/main" id="{E012C92A-B902-4B69-BDCF-CCA3021FCB47}"/>
+                </a:ext>
+                <a:ext uri="{C183D7F6-B498-43B3-948B-1728B52AA6E4}">
+                  <adec:decorative xmlns:adec="http://schemas.microsoft.com/office/drawing/2017/decorative" val="1"/>
+                </a:ext>
+              </a:extLst>
+            </p:cNvPr>
+            <p:cNvCxnSpPr/>
+            <p:nvPr>
+              <p:extLst>
+                <p:ext uri="{386F3935-93C4-4BCD-93E2-E3B085C9AB24}">
+                  <p16:designElem xmlns:p16="http://schemas.microsoft.com/office/powerpoint/2015/main" val="1"/>
+                </p:ext>
+              </p:extLst>
+            </p:nvPr>
+          </p:nvCxnSpPr>
+          <p:spPr>
+            <a:xfrm>
+              <a:off x="9371012" y="0"/>
+              <a:ext cx="1219200" cy="6858000"/>
+            </a:xfrm>
+            <a:prstGeom prst="line">
+              <a:avLst/>
+            </a:prstGeom>
+            <a:ln w="9525">
+              <a:solidFill>
+                <a:schemeClr val="bg1">
+                  <a:lumMod val="75000"/>
+                </a:schemeClr>
+              </a:solidFill>
+            </a:ln>
+          </p:spPr>
+          <p:style>
+            <a:lnRef idx="2">
+              <a:schemeClr val="accent1"/>
+            </a:lnRef>
+            <a:fillRef idx="0">
+              <a:schemeClr val="accent1"/>
+            </a:fillRef>
+            <a:effectRef idx="1">
+              <a:schemeClr val="accent1"/>
+            </a:effectRef>
+            <a:fontRef idx="minor">
+              <a:schemeClr val="tx1"/>
+            </a:fontRef>
+          </p:style>
+        </p:cxnSp>
+        <p:cxnSp>
+          <p:nvCxnSpPr>
+            <p:cNvPr id="15" name="Straight Connector 14">
+              <a:extLst>
+                <a:ext uri="{FF2B5EF4-FFF2-40B4-BE49-F238E27FC236}">
+                  <a16:creationId xmlns:a16="http://schemas.microsoft.com/office/drawing/2014/main" id="{A2BDBC14-42A0-4182-BFBA-0751F6350CB3}"/>
+                </a:ext>
+                <a:ext uri="{C183D7F6-B498-43B3-948B-1728B52AA6E4}">
+                  <adec:decorative xmlns:adec="http://schemas.microsoft.com/office/drawing/2017/decorative" val="1"/>
+                </a:ext>
+              </a:extLst>
+            </p:cNvPr>
+            <p:cNvCxnSpPr/>
+            <p:nvPr>
+              <p:extLst>
+                <p:ext uri="{386F3935-93C4-4BCD-93E2-E3B085C9AB24}">
+                  <p16:designElem xmlns:p16="http://schemas.microsoft.com/office/powerpoint/2015/main" val="1"/>
+                </p:ext>
+              </p:extLst>
+            </p:nvPr>
+          </p:nvCxnSpPr>
+          <p:spPr>
+            <a:xfrm flipH="1">
+              <a:off x="7425267" y="3681413"/>
+              <a:ext cx="4763558" cy="3176587"/>
+            </a:xfrm>
+            <a:prstGeom prst="line">
+              <a:avLst/>
+            </a:prstGeom>
+            <a:ln w="9525">
+              <a:solidFill>
+                <a:schemeClr val="bg1">
+                  <a:lumMod val="85000"/>
+                </a:schemeClr>
+              </a:solidFill>
+            </a:ln>
+          </p:spPr>
+          <p:style>
+            <a:lnRef idx="2">
+              <a:schemeClr val="accent1"/>
+            </a:lnRef>
+            <a:fillRef idx="0">
+              <a:schemeClr val="accent1"/>
+            </a:fillRef>
+            <a:effectRef idx="1">
+              <a:schemeClr val="accent1"/>
+            </a:effectRef>
+            <a:fontRef idx="minor">
+              <a:schemeClr val="tx1"/>
+            </a:fontRef>
+          </p:style>
+        </p:cxnSp>
+        <p:sp>
+          <p:nvSpPr>
+            <p:cNvPr id="16" name="Rectangle 23">
+              <a:extLst>
+                <a:ext uri="{FF2B5EF4-FFF2-40B4-BE49-F238E27FC236}">
+                  <a16:creationId xmlns:a16="http://schemas.microsoft.com/office/drawing/2014/main" id="{902DC474-5BCC-4188-ACDC-AD63E6B187EC}"/>
+                </a:ext>
+                <a:ext uri="{C183D7F6-B498-43B3-948B-1728B52AA6E4}">
+                  <adec:decorative xmlns:adec="http://schemas.microsoft.com/office/drawing/2017/decorative" val="1"/>
+                </a:ext>
+              </a:extLst>
+            </p:cNvPr>
+            <p:cNvSpPr/>
+            <p:nvPr>
+              <p:extLst>
+                <p:ext uri="{386F3935-93C4-4BCD-93E2-E3B085C9AB24}">
+                  <p16:designElem xmlns:p16="http://schemas.microsoft.com/office/powerpoint/2015/main" val="1"/>
+                </p:ext>
+              </p:extLst>
+            </p:nvPr>
+          </p:nvSpPr>
+          <p:spPr>
+            <a:xfrm>
+              <a:off x="9181476" y="-8467"/>
+              <a:ext cx="3007349" cy="6866467"/>
+            </a:xfrm>
+            <a:custGeom>
+              <a:avLst/>
+              <a:gdLst/>
+              <a:ahLst/>
+              <a:cxnLst/>
+              <a:rect l="l" t="t" r="r" b="b"/>
+              <a:pathLst>
+                <a:path w="3007349" h="6866467">
+                  <a:moveTo>
+                    <a:pt x="2045532" y="0"/>
+                  </a:moveTo>
+                  <a:lnTo>
+                    <a:pt x="3007349" y="0"/>
+                  </a:lnTo>
+                  <a:lnTo>
+                    <a:pt x="3007349" y="6866467"/>
+                  </a:lnTo>
+                  <a:lnTo>
+                    <a:pt x="0" y="6866467"/>
+                  </a:lnTo>
+                  <a:lnTo>
+                    <a:pt x="2045532" y="0"/>
+                  </a:lnTo>
+                  <a:close/>
+                </a:path>
+              </a:pathLst>
+            </a:custGeom>
+            <a:solidFill>
+              <a:schemeClr val="accent1">
+                <a:alpha val="30000"/>
+              </a:schemeClr>
+            </a:solidFill>
+            <a:ln>
+              <a:noFill/>
+            </a:ln>
+            <a:effectLst/>
+          </p:spPr>
+          <p:style>
+            <a:lnRef idx="1">
+              <a:schemeClr val="accent1"/>
+            </a:lnRef>
+            <a:fillRef idx="3">
+              <a:schemeClr val="accent1"/>
+            </a:fillRef>
+            <a:effectRef idx="2">
+              <a:schemeClr val="accent1"/>
+            </a:effectRef>
+            <a:fontRef idx="minor">
+              <a:schemeClr val="lt1"/>
+            </a:fontRef>
+          </p:style>
+        </p:sp>
+        <p:sp>
+          <p:nvSpPr>
+            <p:cNvPr id="17" name="Rectangle 25">
+              <a:extLst>
+                <a:ext uri="{FF2B5EF4-FFF2-40B4-BE49-F238E27FC236}">
+                  <a16:creationId xmlns:a16="http://schemas.microsoft.com/office/drawing/2014/main" id="{7B427019-8592-4032-931B-4F27104C9DE2}"/>
+                </a:ext>
+                <a:ext uri="{C183D7F6-B498-43B3-948B-1728B52AA6E4}">
+                  <adec:decorative xmlns:adec="http://schemas.microsoft.com/office/drawing/2017/decorative" val="1"/>
+                </a:ext>
+              </a:extLst>
+            </p:cNvPr>
+            <p:cNvSpPr/>
+            <p:nvPr>
+              <p:extLst>
+                <p:ext uri="{386F3935-93C4-4BCD-93E2-E3B085C9AB24}">
+                  <p16:designElem xmlns:p16="http://schemas.microsoft.com/office/powerpoint/2015/main" val="1"/>
+                </p:ext>
+              </p:extLst>
+            </p:nvPr>
+          </p:nvSpPr>
+          <p:spPr>
+            <a:xfrm>
+              <a:off x="9603442" y="-8467"/>
+              <a:ext cx="2588558" cy="6866467"/>
+            </a:xfrm>
+            <a:custGeom>
+              <a:avLst/>
+              <a:gdLst/>
+              <a:ahLst/>
+              <a:cxnLst/>
+              <a:rect l="l" t="t" r="r" b="b"/>
+              <a:pathLst>
+                <a:path w="2573311" h="6866467">
+                  <a:moveTo>
+                    <a:pt x="0" y="0"/>
+                  </a:moveTo>
+                  <a:lnTo>
+                    <a:pt x="2573311" y="0"/>
+                  </a:lnTo>
+                  <a:lnTo>
+                    <a:pt x="2573311" y="6866467"/>
+                  </a:lnTo>
+                  <a:lnTo>
+                    <a:pt x="1202336" y="6866467"/>
+                  </a:lnTo>
+                  <a:lnTo>
+                    <a:pt x="0" y="0"/>
+                  </a:lnTo>
+                  <a:close/>
+                </a:path>
+              </a:pathLst>
+            </a:custGeom>
+            <a:solidFill>
+              <a:schemeClr val="accent1">
+                <a:alpha val="20000"/>
+              </a:schemeClr>
+            </a:solidFill>
+            <a:ln>
+              <a:noFill/>
+            </a:ln>
+            <a:effectLst/>
+          </p:spPr>
+          <p:style>
+            <a:lnRef idx="1">
+              <a:schemeClr val="accent1"/>
+            </a:lnRef>
+            <a:fillRef idx="3">
+              <a:schemeClr val="accent1"/>
+            </a:fillRef>
+            <a:effectRef idx="2">
+              <a:schemeClr val="accent1"/>
+            </a:effectRef>
+            <a:fontRef idx="minor">
+              <a:schemeClr val="lt1"/>
+            </a:fontRef>
+          </p:style>
+        </p:sp>
+        <p:sp>
+          <p:nvSpPr>
+            <p:cNvPr id="18" name="Isosceles Triangle 17">
+              <a:extLst>
+                <a:ext uri="{FF2B5EF4-FFF2-40B4-BE49-F238E27FC236}">
+                  <a16:creationId xmlns:a16="http://schemas.microsoft.com/office/drawing/2014/main" id="{1D6E2CEA-A5BB-4CF7-B907-AE4DBF6748EB}"/>
+                </a:ext>
+                <a:ext uri="{C183D7F6-B498-43B3-948B-1728B52AA6E4}">
+                  <adec:decorative xmlns:adec="http://schemas.microsoft.com/office/drawing/2017/decorative" val="1"/>
+                </a:ext>
+              </a:extLst>
+            </p:cNvPr>
+            <p:cNvSpPr/>
+            <p:nvPr>
+              <p:extLst>
+                <p:ext uri="{386F3935-93C4-4BCD-93E2-E3B085C9AB24}">
+                  <p16:designElem xmlns:p16="http://schemas.microsoft.com/office/powerpoint/2015/main" val="1"/>
+                </p:ext>
+              </p:extLst>
+            </p:nvPr>
+          </p:nvSpPr>
+          <p:spPr>
+            <a:xfrm>
+              <a:off x="8932333" y="3048000"/>
+              <a:ext cx="3259667" cy="3810000"/>
+            </a:xfrm>
+            <a:prstGeom prst="triangle">
+              <a:avLst>
+                <a:gd name="adj" fmla="val 100000"/>
+              </a:avLst>
+            </a:prstGeom>
+            <a:solidFill>
+              <a:schemeClr val="accent2">
+                <a:alpha val="72000"/>
+              </a:schemeClr>
+            </a:solidFill>
+            <a:ln>
+              <a:noFill/>
+            </a:ln>
+            <a:effectLst/>
+          </p:spPr>
+          <p:style>
+            <a:lnRef idx="1">
+              <a:schemeClr val="accent1"/>
+            </a:lnRef>
+            <a:fillRef idx="3">
+              <a:schemeClr val="accent1"/>
+            </a:fillRef>
+            <a:effectRef idx="2">
+              <a:schemeClr val="accent1"/>
+            </a:effectRef>
+            <a:fontRef idx="minor">
+              <a:schemeClr val="lt1"/>
+            </a:fontRef>
+          </p:style>
+        </p:sp>
+        <p:sp>
+          <p:nvSpPr>
+            <p:cNvPr id="19" name="Rectangle 27">
+              <a:extLst>
+                <a:ext uri="{FF2B5EF4-FFF2-40B4-BE49-F238E27FC236}">
+                  <a16:creationId xmlns:a16="http://schemas.microsoft.com/office/drawing/2014/main" id="{78D09D5A-29CC-4B32-9CE1-72E607558A6C}"/>
+                </a:ext>
+                <a:ext uri="{C183D7F6-B498-43B3-948B-1728B52AA6E4}">
+                  <adec:decorative xmlns:adec="http://schemas.microsoft.com/office/drawing/2017/decorative" val="1"/>
+                </a:ext>
+              </a:extLst>
+            </p:cNvPr>
+            <p:cNvSpPr/>
+            <p:nvPr>
+              <p:extLst>
+                <p:ext uri="{386F3935-93C4-4BCD-93E2-E3B085C9AB24}">
+                  <p16:designElem xmlns:p16="http://schemas.microsoft.com/office/powerpoint/2015/main" val="1"/>
+                </p:ext>
+              </p:extLst>
+            </p:nvPr>
+          </p:nvSpPr>
+          <p:spPr>
+            <a:xfrm>
+              <a:off x="9334500" y="-8467"/>
+              <a:ext cx="2854326" cy="6866467"/>
+            </a:xfrm>
+            <a:custGeom>
+              <a:avLst/>
+              <a:gdLst/>
+              <a:ahLst/>
+              <a:cxnLst/>
+              <a:rect l="l" t="t" r="r" b="b"/>
+              <a:pathLst>
+                <a:path w="2858013" h="6866467">
+                  <a:moveTo>
+                    <a:pt x="0" y="0"/>
+                  </a:moveTo>
+                  <a:lnTo>
+                    <a:pt x="2858013" y="0"/>
+                  </a:lnTo>
+                  <a:lnTo>
+                    <a:pt x="2858013" y="6866467"/>
+                  </a:lnTo>
+                  <a:lnTo>
+                    <a:pt x="2473942" y="6866467"/>
+                  </a:lnTo>
+                  <a:lnTo>
+                    <a:pt x="0" y="0"/>
+                  </a:lnTo>
+                  <a:close/>
+                </a:path>
+              </a:pathLst>
+            </a:custGeom>
+            <a:solidFill>
+              <a:schemeClr val="accent2">
+                <a:lumMod val="75000"/>
+                <a:alpha val="70000"/>
+              </a:schemeClr>
+            </a:solidFill>
+            <a:ln>
+              <a:noFill/>
+            </a:ln>
+            <a:effectLst/>
+          </p:spPr>
+          <p:style>
+            <a:lnRef idx="1">
+              <a:schemeClr val="accent1"/>
+            </a:lnRef>
+            <a:fillRef idx="3">
+              <a:schemeClr val="accent1"/>
+            </a:fillRef>
+            <a:effectRef idx="2">
+              <a:schemeClr val="accent1"/>
+            </a:effectRef>
+            <a:fontRef idx="minor">
+              <a:schemeClr val="lt1"/>
+            </a:fontRef>
+          </p:style>
+        </p:sp>
+        <p:sp>
+          <p:nvSpPr>
+            <p:cNvPr id="20" name="Rectangle 28">
+              <a:extLst>
+                <a:ext uri="{FF2B5EF4-FFF2-40B4-BE49-F238E27FC236}">
+                  <a16:creationId xmlns:a16="http://schemas.microsoft.com/office/drawing/2014/main" id="{6DF3A3FC-950B-40B0-923D-0F0BC1A54204}"/>
+                </a:ext>
+                <a:ext uri="{C183D7F6-B498-43B3-948B-1728B52AA6E4}">
+                  <adec:decorative xmlns:adec="http://schemas.microsoft.com/office/drawing/2017/decorative" val="1"/>
+                </a:ext>
+              </a:extLst>
+            </p:cNvPr>
+            <p:cNvSpPr/>
+            <p:nvPr>
+              <p:extLst>
+                <p:ext uri="{386F3935-93C4-4BCD-93E2-E3B085C9AB24}">
+                  <p16:designElem xmlns:p16="http://schemas.microsoft.com/office/powerpoint/2015/main" val="1"/>
+                </p:ext>
+              </p:extLst>
+            </p:nvPr>
+          </p:nvSpPr>
+          <p:spPr>
+            <a:xfrm>
+              <a:off x="10898730" y="-8467"/>
+              <a:ext cx="1290094" cy="6866467"/>
+            </a:xfrm>
+            <a:custGeom>
+              <a:avLst/>
+              <a:gdLst/>
+              <a:ahLst/>
+              <a:cxnLst/>
+              <a:rect l="l" t="t" r="r" b="b"/>
+              <a:pathLst>
+                <a:path w="1290094" h="6858000">
+                  <a:moveTo>
+                    <a:pt x="1019735" y="0"/>
+                  </a:moveTo>
+                  <a:lnTo>
+                    <a:pt x="1290094" y="0"/>
+                  </a:lnTo>
+                  <a:lnTo>
+                    <a:pt x="1290094" y="6858000"/>
+                  </a:lnTo>
+                  <a:lnTo>
+                    <a:pt x="0" y="6858000"/>
+                  </a:lnTo>
+                  <a:lnTo>
+                    <a:pt x="1019735" y="0"/>
+                  </a:lnTo>
+                  <a:close/>
+                </a:path>
+              </a:pathLst>
+            </a:custGeom>
+            <a:solidFill>
+              <a:schemeClr val="accent1">
+                <a:lumMod val="60000"/>
+                <a:lumOff val="40000"/>
+                <a:alpha val="70000"/>
+              </a:schemeClr>
+            </a:solidFill>
+            <a:ln>
+              <a:noFill/>
+            </a:ln>
+            <a:effectLst/>
+          </p:spPr>
+          <p:style>
+            <a:lnRef idx="1">
+              <a:schemeClr val="accent1"/>
+            </a:lnRef>
+            <a:fillRef idx="3">
+              <a:schemeClr val="accent1"/>
+            </a:fillRef>
+            <a:effectRef idx="2">
+              <a:schemeClr val="accent1"/>
+            </a:effectRef>
+            <a:fontRef idx="minor">
+              <a:schemeClr val="lt1"/>
+            </a:fontRef>
+          </p:style>
+        </p:sp>
+        <p:sp>
+          <p:nvSpPr>
+            <p:cNvPr id="21" name="Rectangle 29">
+              <a:extLst>
+                <a:ext uri="{FF2B5EF4-FFF2-40B4-BE49-F238E27FC236}">
+                  <a16:creationId xmlns:a16="http://schemas.microsoft.com/office/drawing/2014/main" id="{BCA0F2E1-CD3D-4521-9CCB-41A5CC6C543E}"/>
+                </a:ext>
+                <a:ext uri="{C183D7F6-B498-43B3-948B-1728B52AA6E4}">
+                  <adec:decorative xmlns:adec="http://schemas.microsoft.com/office/drawing/2017/decorative" val="1"/>
+                </a:ext>
+              </a:extLst>
+            </p:cNvPr>
+            <p:cNvSpPr/>
+            <p:nvPr>
+              <p:extLst>
+                <p:ext uri="{386F3935-93C4-4BCD-93E2-E3B085C9AB24}">
+                  <p16:designElem xmlns:p16="http://schemas.microsoft.com/office/powerpoint/2015/main" val="1"/>
+                </p:ext>
+              </p:extLst>
+            </p:nvPr>
+          </p:nvSpPr>
+          <p:spPr>
+            <a:xfrm>
+              <a:off x="10938999" y="-8467"/>
+              <a:ext cx="1249825" cy="6866467"/>
+            </a:xfrm>
+            <a:custGeom>
+              <a:avLst/>
+              <a:gdLst/>
+              <a:ahLst/>
+              <a:cxnLst/>
+              <a:rect l="l" t="t" r="r" b="b"/>
+              <a:pathLst>
+                <a:path w="1249825" h="6858000">
+                  <a:moveTo>
+                    <a:pt x="0" y="0"/>
+                  </a:moveTo>
+                  <a:lnTo>
+                    <a:pt x="1249825" y="0"/>
+                  </a:lnTo>
+                  <a:lnTo>
+                    <a:pt x="1249825" y="6858000"/>
+                  </a:lnTo>
+                  <a:lnTo>
+                    <a:pt x="1109382" y="6858000"/>
+                  </a:lnTo>
+                  <a:lnTo>
+                    <a:pt x="0" y="0"/>
+                  </a:lnTo>
+                  <a:close/>
+                </a:path>
+              </a:pathLst>
+            </a:custGeom>
+            <a:solidFill>
+              <a:schemeClr val="accent1">
+                <a:alpha val="65000"/>
+              </a:schemeClr>
+            </a:solidFill>
+            <a:ln>
+              <a:noFill/>
+            </a:ln>
+            <a:effectLst/>
+          </p:spPr>
+          <p:style>
+            <a:lnRef idx="1">
+              <a:schemeClr val="accent1"/>
+            </a:lnRef>
+            <a:fillRef idx="3">
+              <a:schemeClr val="accent1"/>
+            </a:fillRef>
+            <a:effectRef idx="2">
+              <a:schemeClr val="accent1"/>
+            </a:effectRef>
+            <a:fontRef idx="minor">
+              <a:schemeClr val="lt1"/>
+            </a:fontRef>
+          </p:style>
+        </p:sp>
+        <p:sp>
+          <p:nvSpPr>
+            <p:cNvPr id="22" name="Isosceles Triangle 21">
+              <a:extLst>
+                <a:ext uri="{FF2B5EF4-FFF2-40B4-BE49-F238E27FC236}">
+                  <a16:creationId xmlns:a16="http://schemas.microsoft.com/office/drawing/2014/main" id="{9BA4F16A-21DC-462A-AD37-0A93C8B79E1E}"/>
+                </a:ext>
+                <a:ext uri="{C183D7F6-B498-43B3-948B-1728B52AA6E4}">
+                  <adec:decorative xmlns:adec="http://schemas.microsoft.com/office/drawing/2017/decorative" val="1"/>
+                </a:ext>
+              </a:extLst>
+            </p:cNvPr>
+            <p:cNvSpPr/>
+            <p:nvPr>
+              <p:extLst>
+                <p:ext uri="{386F3935-93C4-4BCD-93E2-E3B085C9AB24}">
+                  <p16:designElem xmlns:p16="http://schemas.microsoft.com/office/powerpoint/2015/main" val="1"/>
+                </p:ext>
+              </p:extLst>
+            </p:nvPr>
+          </p:nvSpPr>
+          <p:spPr>
+            <a:xfrm>
+              <a:off x="10371666" y="3589867"/>
+              <a:ext cx="1817159" cy="3268133"/>
+            </a:xfrm>
+            <a:prstGeom prst="triangle">
+              <a:avLst>
+                <a:gd name="adj" fmla="val 100000"/>
+              </a:avLst>
+            </a:prstGeom>
+            <a:solidFill>
+              <a:schemeClr val="accent1">
+                <a:alpha val="80000"/>
+              </a:schemeClr>
+            </a:solidFill>
+            <a:ln>
+              <a:noFill/>
+            </a:ln>
+            <a:effectLst/>
+          </p:spPr>
+          <p:style>
+            <a:lnRef idx="1">
+              <a:schemeClr val="accent1"/>
+            </a:lnRef>
+            <a:fillRef idx="3">
+              <a:schemeClr val="accent1"/>
+            </a:fillRef>
+            <a:effectRef idx="2">
+              <a:schemeClr val="accent1"/>
+            </a:effectRef>
+            <a:fontRef idx="minor">
+              <a:schemeClr val="lt1"/>
+            </a:fontRef>
+          </p:style>
+        </p:sp>
+        <p:sp>
+          <p:nvSpPr>
+            <p:cNvPr id="23" name="Isosceles Triangle 22">
+              <a:extLst>
+                <a:ext uri="{FF2B5EF4-FFF2-40B4-BE49-F238E27FC236}">
+                  <a16:creationId xmlns:a16="http://schemas.microsoft.com/office/drawing/2014/main" id="{FB75EBDD-038D-4572-A372-114938295706}"/>
+                </a:ext>
+                <a:ext uri="{C183D7F6-B498-43B3-948B-1728B52AA6E4}">
+                  <adec:decorative xmlns:adec="http://schemas.microsoft.com/office/drawing/2017/decorative" val="1"/>
+                </a:ext>
+              </a:extLst>
+            </p:cNvPr>
+            <p:cNvSpPr/>
+            <p:nvPr>
+              <p:extLst>
+                <p:ext uri="{386F3935-93C4-4BCD-93E2-E3B085C9AB24}">
+                  <p16:designElem xmlns:p16="http://schemas.microsoft.com/office/powerpoint/2015/main" val="1"/>
+                </p:ext>
+              </p:extLst>
+            </p:nvPr>
+          </p:nvSpPr>
+          <p:spPr>
+            <a:xfrm>
+              <a:off x="0" y="4013200"/>
+              <a:ext cx="448733" cy="2844800"/>
+            </a:xfrm>
+            <a:prstGeom prst="triangle">
+              <a:avLst>
+                <a:gd name="adj" fmla="val 0"/>
+              </a:avLst>
+            </a:prstGeom>
+            <a:solidFill>
+              <a:schemeClr val="accent1">
+                <a:alpha val="85000"/>
+              </a:schemeClr>
+            </a:solidFill>
+            <a:ln>
+              <a:noFill/>
+            </a:ln>
+            <a:effectLst/>
+          </p:spPr>
+          <p:style>
+            <a:lnRef idx="1">
+              <a:schemeClr val="accent1"/>
+            </a:lnRef>
+            <a:fillRef idx="3">
+              <a:schemeClr val="accent1"/>
+            </a:fillRef>
+            <a:effectRef idx="2">
+              <a:schemeClr val="accent1"/>
+            </a:effectRef>
+            <a:fontRef idx="minor">
+              <a:schemeClr val="lt1"/>
+            </a:fontRef>
+          </p:style>
+        </p:sp>
+      </p:grpSp>
+      <p:sp>
+        <p:nvSpPr>
+          <p:cNvPr id="25" name="Rectangle 24">
+            <a:extLst>
+              <a:ext uri="{FF2B5EF4-FFF2-40B4-BE49-F238E27FC236}">
+                <a16:creationId xmlns:a16="http://schemas.microsoft.com/office/drawing/2014/main" id="{21029ED5-F105-4DD2-99C8-1E4422817978}"/>
+              </a:ext>
+              <a:ext uri="{C183D7F6-B498-43B3-948B-1728B52AA6E4}">
+                <adec:decorative xmlns:adec="http://schemas.microsoft.com/office/drawing/2017/decorative" val="1"/>
+              </a:ext>
+            </a:extLst>
+          </p:cNvPr>
+          <p:cNvSpPr>
+            <a:spLocks noGrp="1" noRot="1" noChangeAspect="1" noMove="1" noResize="1" noEditPoints="1" noAdjustHandles="1" noChangeArrowheads="1" noChangeShapeType="1" noTextEdit="1"/>
+          </p:cNvSpPr>
+          <p:nvPr>
+            <p:extLst>
+              <p:ext uri="{386F3935-93C4-4BCD-93E2-E3B085C9AB24}">
+                <p16:designElem xmlns:p16="http://schemas.microsoft.com/office/powerpoint/2015/main" val="1"/>
+              </p:ext>
+            </p:extLst>
+          </p:nvPr>
+        </p:nvSpPr>
+        <p:spPr>
+          <a:xfrm>
+            <a:off x="0" y="0"/>
+            <a:ext cx="12192000" cy="6858000"/>
+          </a:xfrm>
+          <a:prstGeom prst="rect">
+            <a:avLst/>
+          </a:prstGeom>
+          <a:ln>
+            <a:noFill/>
+          </a:ln>
+        </p:spPr>
+        <p:style>
+          <a:lnRef idx="2">
+            <a:schemeClr val="accent1">
+              <a:shade val="50000"/>
+            </a:schemeClr>
+          </a:lnRef>
+          <a:fillRef idx="1">
+            <a:schemeClr val="accent1"/>
+          </a:fillRef>
+          <a:effectRef idx="0">
+            <a:schemeClr val="accent1"/>
+          </a:effectRef>
+          <a:fontRef idx="minor">
+            <a:schemeClr val="lt1"/>
+          </a:fontRef>
+        </p:style>
+        <p:txBody>
+          <a:bodyPr rtlCol="0" anchor="ctr"/>
+          <a:lstStyle/>
+          <a:p>
+            <a:pPr algn="ctr"/>
+            <a:endParaRPr lang="en-US"/>
+          </a:p>
+        </p:txBody>
+      </p:sp>
+      <p:grpSp>
+        <p:nvGrpSpPr>
+          <p:cNvPr id="27" name="Group 26">
+            <a:extLst>
+              <a:ext uri="{FF2B5EF4-FFF2-40B4-BE49-F238E27FC236}">
+                <a16:creationId xmlns:a16="http://schemas.microsoft.com/office/drawing/2014/main" id="{2D621E68-BF28-4A1C-B1A2-4E55E139E79A}"/>
+              </a:ext>
+              <a:ext uri="{C183D7F6-B498-43B3-948B-1728B52AA6E4}">
+                <adec:decorative xmlns:adec="http://schemas.microsoft.com/office/drawing/2017/decorative" val="1"/>
+              </a:ext>
+            </a:extLst>
+          </p:cNvPr>
+          <p:cNvGrpSpPr>
+            <a:grpSpLocks noGrp="1" noUngrp="1" noRot="1" noChangeAspect="1" noMove="1" noResize="1"/>
+          </p:cNvGrpSpPr>
+          <p:nvPr>
+            <p:extLst>
+              <p:ext uri="{386F3935-93C4-4BCD-93E2-E3B085C9AB24}">
+                <p16:designElem xmlns:p16="http://schemas.microsoft.com/office/powerpoint/2015/main" val="1"/>
+              </p:ext>
+            </p:extLst>
+          </p:nvPr>
+        </p:nvGrpSpPr>
+        <p:grpSpPr>
+          <a:xfrm>
+            <a:off x="0" y="-8467"/>
+            <a:ext cx="12192000" cy="6866467"/>
+            <a:chOff x="0" y="-8467"/>
+            <a:chExt cx="12192000" cy="6866467"/>
+          </a:xfrm>
+        </p:grpSpPr>
+        <p:cxnSp>
+          <p:nvCxnSpPr>
+            <p:cNvPr id="28" name="Straight Connector 27">
+              <a:extLst>
+                <a:ext uri="{FF2B5EF4-FFF2-40B4-BE49-F238E27FC236}">
+                  <a16:creationId xmlns:a16="http://schemas.microsoft.com/office/drawing/2014/main" id="{BE8BBE4D-F0DF-49B9-B75A-99DAC53ACA77}"/>
+                </a:ext>
+                <a:ext uri="{C183D7F6-B498-43B3-948B-1728B52AA6E4}">
+                  <adec:decorative xmlns:adec="http://schemas.microsoft.com/office/drawing/2017/decorative" val="1"/>
+                </a:ext>
+              </a:extLst>
+            </p:cNvPr>
+            <p:cNvCxnSpPr/>
+            <p:nvPr>
+              <p:extLst>
+                <p:ext uri="{386F3935-93C4-4BCD-93E2-E3B085C9AB24}">
+                  <p16:designElem xmlns:p16="http://schemas.microsoft.com/office/powerpoint/2015/main" val="1"/>
+                </p:ext>
+              </p:extLst>
+            </p:nvPr>
+          </p:nvCxnSpPr>
+          <p:spPr>
+            <a:xfrm flipH="1">
+              <a:off x="7425267" y="3681413"/>
+              <a:ext cx="4763558" cy="3176587"/>
+            </a:xfrm>
+            <a:prstGeom prst="line">
+              <a:avLst/>
+            </a:prstGeom>
+            <a:ln w="9525">
+              <a:solidFill>
+                <a:schemeClr val="bg1">
+                  <a:lumMod val="85000"/>
+                </a:schemeClr>
+              </a:solidFill>
+            </a:ln>
+          </p:spPr>
+          <p:style>
+            <a:lnRef idx="2">
+              <a:schemeClr val="accent1"/>
+            </a:lnRef>
+            <a:fillRef idx="0">
+              <a:schemeClr val="accent1"/>
+            </a:fillRef>
+            <a:effectRef idx="1">
+              <a:schemeClr val="accent1"/>
+            </a:effectRef>
+            <a:fontRef idx="minor">
+              <a:schemeClr val="tx1"/>
+            </a:fontRef>
+          </p:style>
+        </p:cxnSp>
+        <p:sp>
+          <p:nvSpPr>
+            <p:cNvPr id="29" name="Rectangle 23">
+              <a:extLst>
+                <a:ext uri="{FF2B5EF4-FFF2-40B4-BE49-F238E27FC236}">
+                  <a16:creationId xmlns:a16="http://schemas.microsoft.com/office/drawing/2014/main" id="{E0F07DDC-34A6-46A1-9DE9-2BBE2931A55B}"/>
+                </a:ext>
+                <a:ext uri="{C183D7F6-B498-43B3-948B-1728B52AA6E4}">
+                  <adec:decorative xmlns:adec="http://schemas.microsoft.com/office/drawing/2017/decorative" val="1"/>
+                </a:ext>
+              </a:extLst>
+            </p:cNvPr>
+            <p:cNvSpPr/>
+            <p:nvPr>
+              <p:extLst>
+                <p:ext uri="{386F3935-93C4-4BCD-93E2-E3B085C9AB24}">
+                  <p16:designElem xmlns:p16="http://schemas.microsoft.com/office/powerpoint/2015/main" val="1"/>
+                </p:ext>
+              </p:extLst>
+            </p:nvPr>
+          </p:nvSpPr>
+          <p:spPr>
+            <a:xfrm>
+              <a:off x="9181476" y="-8467"/>
+              <a:ext cx="3007349" cy="6866467"/>
+            </a:xfrm>
+            <a:custGeom>
+              <a:avLst/>
+              <a:gdLst/>
+              <a:ahLst/>
+              <a:cxnLst/>
+              <a:rect l="l" t="t" r="r" b="b"/>
+              <a:pathLst>
+                <a:path w="3007349" h="6866467">
+                  <a:moveTo>
+                    <a:pt x="2045532" y="0"/>
+                  </a:moveTo>
+                  <a:lnTo>
+                    <a:pt x="3007349" y="0"/>
+                  </a:lnTo>
+                  <a:lnTo>
+                    <a:pt x="3007349" y="6866467"/>
+                  </a:lnTo>
+                  <a:lnTo>
+                    <a:pt x="0" y="6866467"/>
+                  </a:lnTo>
+                  <a:lnTo>
+                    <a:pt x="2045532" y="0"/>
+                  </a:lnTo>
+                  <a:close/>
+                </a:path>
+              </a:pathLst>
+            </a:custGeom>
+            <a:solidFill>
+              <a:schemeClr val="accent1">
+                <a:alpha val="30000"/>
+              </a:schemeClr>
+            </a:solidFill>
+            <a:ln>
+              <a:noFill/>
+            </a:ln>
+            <a:effectLst/>
+          </p:spPr>
+          <p:style>
+            <a:lnRef idx="1">
+              <a:schemeClr val="accent1"/>
+            </a:lnRef>
+            <a:fillRef idx="3">
+              <a:schemeClr val="accent1"/>
+            </a:fillRef>
+            <a:effectRef idx="2">
+              <a:schemeClr val="accent1"/>
+            </a:effectRef>
+            <a:fontRef idx="minor">
+              <a:schemeClr val="lt1"/>
+            </a:fontRef>
+          </p:style>
+        </p:sp>
+        <p:sp>
+          <p:nvSpPr>
+            <p:cNvPr id="30" name="Rectangle 25">
+              <a:extLst>
+                <a:ext uri="{FF2B5EF4-FFF2-40B4-BE49-F238E27FC236}">
+                  <a16:creationId xmlns:a16="http://schemas.microsoft.com/office/drawing/2014/main" id="{2CEB2BF9-B8DB-45B9-86EA-D197B5B1AEFF}"/>
+                </a:ext>
+                <a:ext uri="{C183D7F6-B498-43B3-948B-1728B52AA6E4}">
+                  <adec:decorative xmlns:adec="http://schemas.microsoft.com/office/drawing/2017/decorative" val="1"/>
+                </a:ext>
+              </a:extLst>
+            </p:cNvPr>
+            <p:cNvSpPr/>
+            <p:nvPr>
+              <p:extLst>
+                <p:ext uri="{386F3935-93C4-4BCD-93E2-E3B085C9AB24}">
+                  <p16:designElem xmlns:p16="http://schemas.microsoft.com/office/powerpoint/2015/main" val="1"/>
+                </p:ext>
+              </p:extLst>
+            </p:nvPr>
+          </p:nvSpPr>
+          <p:spPr>
+            <a:xfrm>
+              <a:off x="9603442" y="-8467"/>
+              <a:ext cx="2588558" cy="6866467"/>
+            </a:xfrm>
+            <a:custGeom>
+              <a:avLst/>
+              <a:gdLst/>
+              <a:ahLst/>
+              <a:cxnLst/>
+              <a:rect l="l" t="t" r="r" b="b"/>
+              <a:pathLst>
+                <a:path w="2573311" h="6866467">
+                  <a:moveTo>
+                    <a:pt x="0" y="0"/>
+                  </a:moveTo>
+                  <a:lnTo>
+                    <a:pt x="2573311" y="0"/>
+                  </a:lnTo>
+                  <a:lnTo>
+                    <a:pt x="2573311" y="6866467"/>
+                  </a:lnTo>
+                  <a:lnTo>
+                    <a:pt x="1202336" y="6866467"/>
+                  </a:lnTo>
+                  <a:lnTo>
+                    <a:pt x="0" y="0"/>
+                  </a:lnTo>
+                  <a:close/>
+                </a:path>
+              </a:pathLst>
+            </a:custGeom>
+            <a:solidFill>
+              <a:schemeClr val="accent1">
+                <a:alpha val="20000"/>
+              </a:schemeClr>
+            </a:solidFill>
+            <a:ln>
+              <a:noFill/>
+            </a:ln>
+            <a:effectLst/>
+          </p:spPr>
+          <p:style>
+            <a:lnRef idx="1">
+              <a:schemeClr val="accent1"/>
+            </a:lnRef>
+            <a:fillRef idx="3">
+              <a:schemeClr val="accent1"/>
+            </a:fillRef>
+            <a:effectRef idx="2">
+              <a:schemeClr val="accent1"/>
+            </a:effectRef>
+            <a:fontRef idx="minor">
+              <a:schemeClr val="lt1"/>
+            </a:fontRef>
+          </p:style>
+        </p:sp>
+        <p:sp>
+          <p:nvSpPr>
+            <p:cNvPr id="31" name="Isosceles Triangle 30">
+              <a:extLst>
+                <a:ext uri="{FF2B5EF4-FFF2-40B4-BE49-F238E27FC236}">
+                  <a16:creationId xmlns:a16="http://schemas.microsoft.com/office/drawing/2014/main" id="{08B5BB34-3801-4E70-A981-FE007635E11D}"/>
+                </a:ext>
+                <a:ext uri="{C183D7F6-B498-43B3-948B-1728B52AA6E4}">
+                  <adec:decorative xmlns:adec="http://schemas.microsoft.com/office/drawing/2017/decorative" val="1"/>
+                </a:ext>
+              </a:extLst>
+            </p:cNvPr>
+            <p:cNvSpPr/>
+            <p:nvPr>
+              <p:extLst>
+                <p:ext uri="{386F3935-93C4-4BCD-93E2-E3B085C9AB24}">
+                  <p16:designElem xmlns:p16="http://schemas.microsoft.com/office/powerpoint/2015/main" val="1"/>
+                </p:ext>
+              </p:extLst>
+            </p:nvPr>
+          </p:nvSpPr>
+          <p:spPr>
+            <a:xfrm>
+              <a:off x="8932333" y="3048000"/>
+              <a:ext cx="3259667" cy="3810000"/>
+            </a:xfrm>
+            <a:prstGeom prst="triangle">
+              <a:avLst>
+                <a:gd name="adj" fmla="val 100000"/>
+              </a:avLst>
+            </a:prstGeom>
+            <a:solidFill>
+              <a:schemeClr val="accent2">
+                <a:alpha val="72000"/>
+              </a:schemeClr>
+            </a:solidFill>
+            <a:ln>
+              <a:noFill/>
+            </a:ln>
+            <a:effectLst/>
+          </p:spPr>
+          <p:style>
+            <a:lnRef idx="1">
+              <a:schemeClr val="accent1"/>
+            </a:lnRef>
+            <a:fillRef idx="3">
+              <a:schemeClr val="accent1"/>
+            </a:fillRef>
+            <a:effectRef idx="2">
+              <a:schemeClr val="accent1"/>
+            </a:effectRef>
+            <a:fontRef idx="minor">
+              <a:schemeClr val="lt1"/>
+            </a:fontRef>
+          </p:style>
+        </p:sp>
+        <p:sp>
+          <p:nvSpPr>
+            <p:cNvPr id="32" name="Rectangle 27">
+              <a:extLst>
+                <a:ext uri="{FF2B5EF4-FFF2-40B4-BE49-F238E27FC236}">
+                  <a16:creationId xmlns:a16="http://schemas.microsoft.com/office/drawing/2014/main" id="{38432A75-2CEB-463C-A8F2-ABB50A79F444}"/>
+                </a:ext>
+                <a:ext uri="{C183D7F6-B498-43B3-948B-1728B52AA6E4}">
+                  <adec:decorative xmlns:adec="http://schemas.microsoft.com/office/drawing/2017/decorative" val="1"/>
+                </a:ext>
+              </a:extLst>
+            </p:cNvPr>
+            <p:cNvSpPr/>
+            <p:nvPr>
+              <p:extLst>
+                <p:ext uri="{386F3935-93C4-4BCD-93E2-E3B085C9AB24}">
+                  <p16:designElem xmlns:p16="http://schemas.microsoft.com/office/powerpoint/2015/main" val="1"/>
+                </p:ext>
+              </p:extLst>
+            </p:nvPr>
+          </p:nvSpPr>
+          <p:spPr>
+            <a:xfrm>
+              <a:off x="9334500" y="-8467"/>
+              <a:ext cx="2854326" cy="6866467"/>
+            </a:xfrm>
+            <a:custGeom>
+              <a:avLst/>
+              <a:gdLst/>
+              <a:ahLst/>
+              <a:cxnLst/>
+              <a:rect l="l" t="t" r="r" b="b"/>
+              <a:pathLst>
+                <a:path w="2858013" h="6866467">
+                  <a:moveTo>
+                    <a:pt x="0" y="0"/>
+                  </a:moveTo>
+                  <a:lnTo>
+                    <a:pt x="2858013" y="0"/>
+                  </a:lnTo>
+                  <a:lnTo>
+                    <a:pt x="2858013" y="6866467"/>
+                  </a:lnTo>
+                  <a:lnTo>
+                    <a:pt x="2473942" y="6866467"/>
+                  </a:lnTo>
+                  <a:lnTo>
+                    <a:pt x="0" y="0"/>
+                  </a:lnTo>
+                  <a:close/>
+                </a:path>
+              </a:pathLst>
+            </a:custGeom>
+            <a:solidFill>
+              <a:schemeClr val="accent2">
+                <a:lumMod val="75000"/>
+                <a:alpha val="70000"/>
+              </a:schemeClr>
+            </a:solidFill>
+            <a:ln>
+              <a:noFill/>
+            </a:ln>
+            <a:effectLst/>
+          </p:spPr>
+          <p:style>
+            <a:lnRef idx="1">
+              <a:schemeClr val="accent1"/>
+            </a:lnRef>
+            <a:fillRef idx="3">
+              <a:schemeClr val="accent1"/>
+            </a:fillRef>
+            <a:effectRef idx="2">
+              <a:schemeClr val="accent1"/>
+            </a:effectRef>
+            <a:fontRef idx="minor">
+              <a:schemeClr val="lt1"/>
+            </a:fontRef>
+          </p:style>
+        </p:sp>
+        <p:sp>
+          <p:nvSpPr>
+            <p:cNvPr id="33" name="Rectangle 28">
+              <a:extLst>
+                <a:ext uri="{FF2B5EF4-FFF2-40B4-BE49-F238E27FC236}">
+                  <a16:creationId xmlns:a16="http://schemas.microsoft.com/office/drawing/2014/main" id="{E7E850B8-C050-4597-8BEB-113FEC9A27C9}"/>
+                </a:ext>
+                <a:ext uri="{C183D7F6-B498-43B3-948B-1728B52AA6E4}">
+                  <adec:decorative xmlns:adec="http://schemas.microsoft.com/office/drawing/2017/decorative" val="1"/>
+                </a:ext>
+              </a:extLst>
+            </p:cNvPr>
+            <p:cNvSpPr/>
+            <p:nvPr>
+              <p:extLst>
+                <p:ext uri="{386F3935-93C4-4BCD-93E2-E3B085C9AB24}">
+                  <p16:designElem xmlns:p16="http://schemas.microsoft.com/office/powerpoint/2015/main" val="1"/>
+                </p:ext>
+              </p:extLst>
+            </p:nvPr>
+          </p:nvSpPr>
+          <p:spPr>
+            <a:xfrm>
+              <a:off x="10898730" y="-8467"/>
+              <a:ext cx="1290094" cy="6866467"/>
+            </a:xfrm>
+            <a:custGeom>
+              <a:avLst/>
+              <a:gdLst/>
+              <a:ahLst/>
+              <a:cxnLst/>
+              <a:rect l="l" t="t" r="r" b="b"/>
+              <a:pathLst>
+                <a:path w="1290094" h="6858000">
+                  <a:moveTo>
+                    <a:pt x="1019735" y="0"/>
+                  </a:moveTo>
+                  <a:lnTo>
+                    <a:pt x="1290094" y="0"/>
+                  </a:lnTo>
+                  <a:lnTo>
+                    <a:pt x="1290094" y="6858000"/>
+                  </a:lnTo>
+                  <a:lnTo>
+                    <a:pt x="0" y="6858000"/>
+                  </a:lnTo>
+                  <a:lnTo>
+                    <a:pt x="1019735" y="0"/>
+                  </a:lnTo>
+                  <a:close/>
+                </a:path>
+              </a:pathLst>
+            </a:custGeom>
+            <a:solidFill>
+              <a:schemeClr val="accent1">
+                <a:lumMod val="60000"/>
+                <a:lumOff val="40000"/>
+                <a:alpha val="70000"/>
+              </a:schemeClr>
+            </a:solidFill>
+            <a:ln>
+              <a:noFill/>
+            </a:ln>
+            <a:effectLst/>
+          </p:spPr>
+          <p:style>
+            <a:lnRef idx="1">
+              <a:schemeClr val="accent1"/>
+            </a:lnRef>
+            <a:fillRef idx="3">
+              <a:schemeClr val="accent1"/>
+            </a:fillRef>
+            <a:effectRef idx="2">
+              <a:schemeClr val="accent1"/>
+            </a:effectRef>
+            <a:fontRef idx="minor">
+              <a:schemeClr val="lt1"/>
+            </a:fontRef>
+          </p:style>
+        </p:sp>
+        <p:sp>
+          <p:nvSpPr>
+            <p:cNvPr id="34" name="Rectangle 29">
+              <a:extLst>
+                <a:ext uri="{FF2B5EF4-FFF2-40B4-BE49-F238E27FC236}">
+                  <a16:creationId xmlns:a16="http://schemas.microsoft.com/office/drawing/2014/main" id="{24ACC798-9CEC-4B6F-A8DD-F8E6FCCCF164}"/>
+                </a:ext>
+                <a:ext uri="{C183D7F6-B498-43B3-948B-1728B52AA6E4}">
+                  <adec:decorative xmlns:adec="http://schemas.microsoft.com/office/drawing/2017/decorative" val="1"/>
+                </a:ext>
+              </a:extLst>
+            </p:cNvPr>
+            <p:cNvSpPr/>
+            <p:nvPr>
+              <p:extLst>
+                <p:ext uri="{386F3935-93C4-4BCD-93E2-E3B085C9AB24}">
+                  <p16:designElem xmlns:p16="http://schemas.microsoft.com/office/powerpoint/2015/main" val="1"/>
+                </p:ext>
+              </p:extLst>
+            </p:nvPr>
+          </p:nvSpPr>
+          <p:spPr>
+            <a:xfrm>
+              <a:off x="10938999" y="-8467"/>
+              <a:ext cx="1249825" cy="6866467"/>
+            </a:xfrm>
+            <a:custGeom>
+              <a:avLst/>
+              <a:gdLst/>
+              <a:ahLst/>
+              <a:cxnLst/>
+              <a:rect l="l" t="t" r="r" b="b"/>
+              <a:pathLst>
+                <a:path w="1249825" h="6858000">
+                  <a:moveTo>
+                    <a:pt x="0" y="0"/>
+                  </a:moveTo>
+                  <a:lnTo>
+                    <a:pt x="1249825" y="0"/>
+                  </a:lnTo>
+                  <a:lnTo>
+                    <a:pt x="1249825" y="6858000"/>
+                  </a:lnTo>
+                  <a:lnTo>
+                    <a:pt x="1109382" y="6858000"/>
+                  </a:lnTo>
+                  <a:lnTo>
+                    <a:pt x="0" y="0"/>
+                  </a:lnTo>
+                  <a:close/>
+                </a:path>
+              </a:pathLst>
+            </a:custGeom>
+            <a:solidFill>
+              <a:schemeClr val="accent1">
+                <a:alpha val="65000"/>
+              </a:schemeClr>
+            </a:solidFill>
+            <a:ln>
+              <a:noFill/>
+            </a:ln>
+            <a:effectLst/>
+          </p:spPr>
+          <p:style>
+            <a:lnRef idx="1">
+              <a:schemeClr val="accent1"/>
+            </a:lnRef>
+            <a:fillRef idx="3">
+              <a:schemeClr val="accent1"/>
+            </a:fillRef>
+            <a:effectRef idx="2">
+              <a:schemeClr val="accent1"/>
+            </a:effectRef>
+            <a:fontRef idx="minor">
+              <a:schemeClr val="lt1"/>
+            </a:fontRef>
+          </p:style>
+        </p:sp>
+        <p:sp>
+          <p:nvSpPr>
+            <p:cNvPr id="35" name="Isosceles Triangle 34">
+              <a:extLst>
+                <a:ext uri="{FF2B5EF4-FFF2-40B4-BE49-F238E27FC236}">
+                  <a16:creationId xmlns:a16="http://schemas.microsoft.com/office/drawing/2014/main" id="{1D58A8C6-1294-4CD9-89BC-F1E981A524AA}"/>
+                </a:ext>
+                <a:ext uri="{C183D7F6-B498-43B3-948B-1728B52AA6E4}">
+                  <adec:decorative xmlns:adec="http://schemas.microsoft.com/office/drawing/2017/decorative" val="1"/>
+                </a:ext>
+              </a:extLst>
+            </p:cNvPr>
+            <p:cNvSpPr/>
+            <p:nvPr>
+              <p:extLst>
+                <p:ext uri="{386F3935-93C4-4BCD-93E2-E3B085C9AB24}">
+                  <p16:designElem xmlns:p16="http://schemas.microsoft.com/office/powerpoint/2015/main" val="1"/>
+                </p:ext>
+              </p:extLst>
+            </p:nvPr>
+          </p:nvSpPr>
+          <p:spPr>
+            <a:xfrm>
+              <a:off x="10371666" y="3589867"/>
+              <a:ext cx="1817159" cy="3268133"/>
+            </a:xfrm>
+            <a:prstGeom prst="triangle">
+              <a:avLst>
+                <a:gd name="adj" fmla="val 100000"/>
+              </a:avLst>
+            </a:prstGeom>
+            <a:solidFill>
+              <a:schemeClr val="accent1">
+                <a:alpha val="80000"/>
+              </a:schemeClr>
+            </a:solidFill>
+            <a:ln>
+              <a:noFill/>
+            </a:ln>
+            <a:effectLst/>
+          </p:spPr>
+          <p:style>
+            <a:lnRef idx="1">
+              <a:schemeClr val="accent1"/>
+            </a:lnRef>
+            <a:fillRef idx="3">
+              <a:schemeClr val="accent1"/>
+            </a:fillRef>
+            <a:effectRef idx="2">
+              <a:schemeClr val="accent1"/>
+            </a:effectRef>
+            <a:fontRef idx="minor">
+              <a:schemeClr val="lt1"/>
+            </a:fontRef>
+          </p:style>
+        </p:sp>
+        <p:sp>
+          <p:nvSpPr>
+            <p:cNvPr id="36" name="Isosceles Triangle 35">
+              <a:extLst>
+                <a:ext uri="{FF2B5EF4-FFF2-40B4-BE49-F238E27FC236}">
+                  <a16:creationId xmlns:a16="http://schemas.microsoft.com/office/drawing/2014/main" id="{F32F2ED6-6143-46C4-A641-72D42732B6FA}"/>
+                </a:ext>
+                <a:ext uri="{C183D7F6-B498-43B3-948B-1728B52AA6E4}">
+                  <adec:decorative xmlns:adec="http://schemas.microsoft.com/office/drawing/2017/decorative" val="1"/>
+                </a:ext>
+              </a:extLst>
+            </p:cNvPr>
+            <p:cNvSpPr/>
+            <p:nvPr>
+              <p:extLst>
+                <p:ext uri="{386F3935-93C4-4BCD-93E2-E3B085C9AB24}">
+                  <p16:designElem xmlns:p16="http://schemas.microsoft.com/office/powerpoint/2015/main" val="1"/>
+                </p:ext>
+              </p:extLst>
+            </p:nvPr>
+          </p:nvSpPr>
+          <p:spPr>
+            <a:xfrm>
+              <a:off x="0" y="4013200"/>
+              <a:ext cx="448733" cy="2844800"/>
+            </a:xfrm>
+            <a:prstGeom prst="triangle">
+              <a:avLst>
+                <a:gd name="adj" fmla="val 0"/>
+              </a:avLst>
+            </a:prstGeom>
+            <a:solidFill>
+              <a:schemeClr val="accent1">
+                <a:alpha val="85000"/>
+              </a:schemeClr>
+            </a:solidFill>
+            <a:ln>
+              <a:noFill/>
+            </a:ln>
+            <a:effectLst/>
+          </p:spPr>
+          <p:style>
+            <a:lnRef idx="1">
+              <a:schemeClr val="accent1"/>
+            </a:lnRef>
+            <a:fillRef idx="3">
+              <a:schemeClr val="accent1"/>
+            </a:fillRef>
+            <a:effectRef idx="2">
+              <a:schemeClr val="accent1"/>
+            </a:effectRef>
+            <a:fontRef idx="minor">
+              <a:schemeClr val="lt1"/>
+            </a:fontRef>
+          </p:style>
+        </p:sp>
+      </p:grpSp>
+      <p:sp>
+        <p:nvSpPr>
+          <p:cNvPr id="38" name="Rectangle 37">
+            <a:extLst>
+              <a:ext uri="{FF2B5EF4-FFF2-40B4-BE49-F238E27FC236}">
+                <a16:creationId xmlns:a16="http://schemas.microsoft.com/office/drawing/2014/main" id="{5C9652B3-A450-4ED6-8FBF-F536BA60B4D8}"/>
+              </a:ext>
+              <a:ext uri="{C183D7F6-B498-43B3-948B-1728B52AA6E4}">
+                <adec:decorative xmlns:adec="http://schemas.microsoft.com/office/drawing/2017/decorative" val="1"/>
+              </a:ext>
+            </a:extLst>
+          </p:cNvPr>
+          <p:cNvSpPr>
+            <a:spLocks noGrp="1" noRot="1" noChangeAspect="1" noMove="1" noResize="1" noEditPoints="1" noAdjustHandles="1" noChangeArrowheads="1" noChangeShapeType="1" noTextEdit="1"/>
+          </p:cNvSpPr>
+          <p:nvPr>
+            <p:extLst>
+              <p:ext uri="{386F3935-93C4-4BCD-93E2-E3B085C9AB24}">
+                <p16:designElem xmlns:p16="http://schemas.microsoft.com/office/powerpoint/2015/main" val="1"/>
+              </p:ext>
+            </p:extLst>
+          </p:nvPr>
+        </p:nvSpPr>
+        <p:spPr>
+          <a:xfrm>
+            <a:off x="477012" y="480060"/>
+            <a:ext cx="11237976" cy="5897880"/>
+          </a:xfrm>
+          <a:prstGeom prst="rect">
+            <a:avLst/>
+          </a:prstGeom>
+          <a:solidFill>
+            <a:srgbClr val="FFFFFF"/>
+          </a:solidFill>
+          <a:ln w="22225">
+            <a:solidFill>
+              <a:srgbClr val="FFFFFF"/>
+            </a:solidFill>
+          </a:ln>
+        </p:spPr>
+        <p:style>
+          <a:lnRef idx="2">
+            <a:schemeClr val="accent1">
+              <a:shade val="50000"/>
+            </a:schemeClr>
+          </a:lnRef>
+          <a:fillRef idx="1">
+            <a:schemeClr val="accent1"/>
+          </a:fillRef>
+          <a:effectRef idx="0">
+            <a:schemeClr val="accent1"/>
+          </a:effectRef>
+          <a:fontRef idx="minor">
+            <a:schemeClr val="lt1"/>
+          </a:fontRef>
+        </p:style>
+        <p:txBody>
+          <a:bodyPr rtlCol="0" anchor="ctr"/>
+          <a:lstStyle/>
+          <a:p>
+            <a:pPr algn="ctr"/>
+            <a:endParaRPr lang="en-US"/>
+          </a:p>
+        </p:txBody>
+      </p:sp>
+      <p:pic>
+        <p:nvPicPr>
+          <p:cNvPr id="8" name="Picture 7">
+            <a:extLst>
+              <a:ext uri="{FF2B5EF4-FFF2-40B4-BE49-F238E27FC236}">
+                <a16:creationId xmlns:a16="http://schemas.microsoft.com/office/drawing/2014/main" id="{C6EA98B5-9A23-C855-651E-D0FDAB20E0A9}"/>
+              </a:ext>
+            </a:extLst>
+          </p:cNvPr>
+          <p:cNvPicPr>
+            <a:picLocks noChangeAspect="1"/>
+          </p:cNvPicPr>
+          <p:nvPr/>
+        </p:nvPicPr>
+        <p:blipFill rotWithShape="1">
+          <a:blip r:embed="rId2"/>
+          <a:srcRect t="8097" r="1" b="1"/>
+          <a:stretch/>
+        </p:blipFill>
+        <p:spPr>
+          <a:xfrm>
+            <a:off x="568452" y="571500"/>
+            <a:ext cx="11055096" cy="5715000"/>
+          </a:xfrm>
+          <a:prstGeom prst="rect">
+            <a:avLst/>
+          </a:prstGeom>
+        </p:spPr>
+      </p:pic>
+      <p:sp>
+        <p:nvSpPr>
+          <p:cNvPr id="5" name="Footer Placeholder 4">
+            <a:extLst>
+              <a:ext uri="{FF2B5EF4-FFF2-40B4-BE49-F238E27FC236}">
+                <a16:creationId xmlns:a16="http://schemas.microsoft.com/office/drawing/2014/main" id="{B4A7F82D-96A4-5303-D8EB-74E86293B70D}"/>
+              </a:ext>
+            </a:extLst>
+          </p:cNvPr>
+          <p:cNvSpPr>
+            <a:spLocks noGrp="1"/>
+          </p:cNvSpPr>
+          <p:nvPr>
+            <p:ph type="ftr" sz="quarter" idx="11"/>
+          </p:nvPr>
+        </p:nvSpPr>
+        <p:spPr>
+          <a:xfrm>
+            <a:off x="677333" y="6420107"/>
+            <a:ext cx="5142441" cy="365125"/>
+          </a:xfrm>
+        </p:spPr>
+        <p:txBody>
+          <a:bodyPr vert="horz" lIns="91440" tIns="45720" rIns="91440" bIns="45720" rtlCol="0" anchor="ctr">
+            <a:normAutofit/>
+          </a:bodyPr>
+          <a:lstStyle/>
+          <a:p>
+            <a:pPr>
+              <a:spcAft>
+                <a:spcPts val="600"/>
+              </a:spcAft>
+            </a:pPr>
+            <a:r>
+              <a:rPr lang="en-US" kern="1200">
+                <a:solidFill>
+                  <a:srgbClr val="FFFFFF"/>
+                </a:solidFill>
+                <a:latin typeface="+mn-lt"/>
+                <a:ea typeface="+mn-ea"/>
+                <a:cs typeface="+mn-cs"/>
+              </a:rPr>
+              <a:t>Microsoft Corporation</a:t>
+            </a:r>
+          </a:p>
+        </p:txBody>
+      </p:sp>
+      <p:sp>
+        <p:nvSpPr>
+          <p:cNvPr id="4" name="Date Placeholder 3">
+            <a:extLst>
+              <a:ext uri="{FF2B5EF4-FFF2-40B4-BE49-F238E27FC236}">
+                <a16:creationId xmlns:a16="http://schemas.microsoft.com/office/drawing/2014/main" id="{B31D18C9-D53A-BA39-8223-EE6429F95FB3}"/>
+              </a:ext>
+            </a:extLst>
+          </p:cNvPr>
+          <p:cNvSpPr>
+            <a:spLocks noGrp="1"/>
+          </p:cNvSpPr>
+          <p:nvPr>
+            <p:ph type="dt" sz="half" idx="10"/>
+          </p:nvPr>
+        </p:nvSpPr>
+        <p:spPr>
+          <a:xfrm>
+            <a:off x="6152556" y="6420107"/>
+            <a:ext cx="4305893" cy="365125"/>
+          </a:xfrm>
+        </p:spPr>
+        <p:txBody>
+          <a:bodyPr vert="horz" lIns="91440" tIns="45720" rIns="91440" bIns="45720" rtlCol="0" anchor="ctr">
+            <a:normAutofit/>
+          </a:bodyPr>
+          <a:lstStyle/>
+          <a:p>
+            <a:pPr>
+              <a:spcAft>
+                <a:spcPts val="600"/>
+              </a:spcAft>
+            </a:pPr>
+            <a:r>
+              <a:rPr lang="en-US">
+                <a:solidFill>
+                  <a:srgbClr val="FFFFFF"/>
+                </a:solidFill>
+              </a:rPr>
+              <a:t>jun 2022.</a:t>
+            </a:r>
+          </a:p>
+        </p:txBody>
+      </p:sp>
+      <p:sp>
+        <p:nvSpPr>
+          <p:cNvPr id="6" name="Slide Number Placeholder 5">
+            <a:extLst>
+              <a:ext uri="{FF2B5EF4-FFF2-40B4-BE49-F238E27FC236}">
+                <a16:creationId xmlns:a16="http://schemas.microsoft.com/office/drawing/2014/main" id="{DF803A47-5D61-8133-E012-D0DCC245289A}"/>
+              </a:ext>
+            </a:extLst>
+          </p:cNvPr>
+          <p:cNvSpPr>
+            <a:spLocks noGrp="1"/>
+          </p:cNvSpPr>
+          <p:nvPr>
+            <p:ph type="sldNum" sz="quarter" idx="12"/>
+          </p:nvPr>
+        </p:nvSpPr>
+        <p:spPr>
+          <a:xfrm>
+            <a:off x="10860438" y="6420107"/>
+            <a:ext cx="683339" cy="365125"/>
+          </a:xfrm>
+        </p:spPr>
+        <p:txBody>
+          <a:bodyPr vert="horz" lIns="91440" tIns="45720" rIns="91440" bIns="45720" rtlCol="0" anchor="ctr">
+            <a:normAutofit/>
+          </a:bodyPr>
+          <a:lstStyle/>
+          <a:p>
+            <a:pPr>
+              <a:spcAft>
+                <a:spcPts val="600"/>
+              </a:spcAft>
+            </a:pPr>
+            <a:fld id="{250E9F36-6C21-4A52-9634-81CC1425D2B6}" type="slidenum">
+              <a:rPr lang="en-US">
+                <a:solidFill>
+                  <a:srgbClr val="FFFFFF"/>
+                </a:solidFill>
+              </a:rPr>
+              <a:pPr>
+                <a:spcAft>
+                  <a:spcPts val="600"/>
+                </a:spcAft>
+              </a:pPr>
+              <a:t>11</a:t>
+            </a:fld>
+            <a:endParaRPr lang="en-US">
+              <a:solidFill>
+                <a:srgbClr val="FFFFFF"/>
+              </a:solidFill>
+            </a:endParaRPr>
+          </a:p>
+        </p:txBody>
+      </p:sp>
+    </p:spTree>
+    <p:extLst>
+      <p:ext uri="{BB962C8B-B14F-4D97-AF65-F5344CB8AC3E}">
+        <p14:creationId xmlns:p14="http://schemas.microsoft.com/office/powerpoint/2010/main" val="4278579552"/>
+      </p:ext>
+    </p:extLst>
+  </p:cSld>
+  <p:clrMapOvr>
+    <a:masterClrMapping/>
+  </p:clrMapOvr>
+</p:sld>
+</file>
+
+<file path=ppt/slides/slide12.xml><?xml version="1.0" encoding="utf-8"?>
+<p:sld xmlns:a="http://schemas.openxmlformats.org/drawingml/2006/main" xmlns:r="http://schemas.openxmlformats.org/officeDocument/2006/relationships" xmlns:p="http://schemas.openxmlformats.org/presentationml/2006/main">
+  <p:cSld>
+    <p:bg>
+      <p:bgPr>
+        <a:solidFill>
+          <a:schemeClr val="bg1"/>
+        </a:solidFill>
+        <a:effectLst/>
+      </p:bgPr>
+    </p:bg>
+    <p:spTree>
+      <p:nvGrpSpPr>
+        <p:cNvPr id="1" name=""/>
+        <p:cNvGrpSpPr/>
+        <p:nvPr/>
+      </p:nvGrpSpPr>
+      <p:grpSpPr>
+        <a:xfrm>
+          <a:off x="0" y="0"/>
+          <a:ext cx="0" cy="0"/>
+          <a:chOff x="0" y="0"/>
+          <a:chExt cx="0" cy="0"/>
+        </a:xfrm>
+      </p:grpSpPr>
+      <p:grpSp>
+        <p:nvGrpSpPr>
+          <p:cNvPr id="13" name="Group 12">
+            <a:extLst>
+              <a:ext uri="{FF2B5EF4-FFF2-40B4-BE49-F238E27FC236}">
+                <a16:creationId xmlns:a16="http://schemas.microsoft.com/office/drawing/2014/main" id="{DDE8DE2B-61C1-46D5-BEB8-521321C182C4}"/>
+              </a:ext>
+              <a:ext uri="{C183D7F6-B498-43B3-948B-1728B52AA6E4}">
+                <adec:decorative xmlns:adec="http://schemas.microsoft.com/office/drawing/2017/decorative" val="1"/>
+              </a:ext>
+            </a:extLst>
+          </p:cNvPr>
+          <p:cNvGrpSpPr>
+            <a:grpSpLocks noGrp="1" noUngrp="1" noRot="1" noChangeAspect="1" noMove="1" noResize="1"/>
+          </p:cNvGrpSpPr>
+          <p:nvPr>
+            <p:extLst>
+              <p:ext uri="{386F3935-93C4-4BCD-93E2-E3B085C9AB24}">
+                <p16:designElem xmlns:p16="http://schemas.microsoft.com/office/powerpoint/2015/main" val="1"/>
+              </p:ext>
+            </p:extLst>
+          </p:nvPr>
+        </p:nvGrpSpPr>
+        <p:grpSpPr>
+          <a:xfrm>
+            <a:off x="0" y="-8467"/>
+            <a:ext cx="12192000" cy="6866467"/>
+            <a:chOff x="0" y="-8467"/>
+            <a:chExt cx="12192000" cy="6866467"/>
+          </a:xfrm>
+        </p:grpSpPr>
+        <p:cxnSp>
+          <p:nvCxnSpPr>
+            <p:cNvPr id="14" name="Straight Connector 13">
+              <a:extLst>
+                <a:ext uri="{FF2B5EF4-FFF2-40B4-BE49-F238E27FC236}">
+                  <a16:creationId xmlns:a16="http://schemas.microsoft.com/office/drawing/2014/main" id="{E012C92A-B902-4B69-BDCF-CCA3021FCB47}"/>
+                </a:ext>
+                <a:ext uri="{C183D7F6-B498-43B3-948B-1728B52AA6E4}">
+                  <adec:decorative xmlns:adec="http://schemas.microsoft.com/office/drawing/2017/decorative" val="1"/>
+                </a:ext>
+              </a:extLst>
+            </p:cNvPr>
+            <p:cNvCxnSpPr/>
+            <p:nvPr>
+              <p:extLst>
+                <p:ext uri="{386F3935-93C4-4BCD-93E2-E3B085C9AB24}">
+                  <p16:designElem xmlns:p16="http://schemas.microsoft.com/office/powerpoint/2015/main" val="1"/>
+                </p:ext>
+              </p:extLst>
+            </p:nvPr>
+          </p:nvCxnSpPr>
+          <p:spPr>
+            <a:xfrm>
+              <a:off x="9371012" y="0"/>
+              <a:ext cx="1219200" cy="6858000"/>
+            </a:xfrm>
+            <a:prstGeom prst="line">
+              <a:avLst/>
+            </a:prstGeom>
+            <a:ln w="9525">
+              <a:solidFill>
+                <a:schemeClr val="bg1">
+                  <a:lumMod val="75000"/>
+                </a:schemeClr>
+              </a:solidFill>
+            </a:ln>
+          </p:spPr>
+          <p:style>
+            <a:lnRef idx="2">
+              <a:schemeClr val="accent1"/>
+            </a:lnRef>
+            <a:fillRef idx="0">
+              <a:schemeClr val="accent1"/>
+            </a:fillRef>
+            <a:effectRef idx="1">
+              <a:schemeClr val="accent1"/>
+            </a:effectRef>
+            <a:fontRef idx="minor">
+              <a:schemeClr val="tx1"/>
+            </a:fontRef>
+          </p:style>
+        </p:cxnSp>
+        <p:cxnSp>
+          <p:nvCxnSpPr>
+            <p:cNvPr id="15" name="Straight Connector 14">
+              <a:extLst>
+                <a:ext uri="{FF2B5EF4-FFF2-40B4-BE49-F238E27FC236}">
+                  <a16:creationId xmlns:a16="http://schemas.microsoft.com/office/drawing/2014/main" id="{A2BDBC14-42A0-4182-BFBA-0751F6350CB3}"/>
+                </a:ext>
+                <a:ext uri="{C183D7F6-B498-43B3-948B-1728B52AA6E4}">
+                  <adec:decorative xmlns:adec="http://schemas.microsoft.com/office/drawing/2017/decorative" val="1"/>
+                </a:ext>
+              </a:extLst>
+            </p:cNvPr>
+            <p:cNvCxnSpPr/>
+            <p:nvPr>
+              <p:extLst>
+                <p:ext uri="{386F3935-93C4-4BCD-93E2-E3B085C9AB24}">
+                  <p16:designElem xmlns:p16="http://schemas.microsoft.com/office/powerpoint/2015/main" val="1"/>
+                </p:ext>
+              </p:extLst>
+            </p:nvPr>
+          </p:nvCxnSpPr>
+          <p:spPr>
+            <a:xfrm flipH="1">
+              <a:off x="7425267" y="3681413"/>
+              <a:ext cx="4763558" cy="3176587"/>
+            </a:xfrm>
+            <a:prstGeom prst="line">
+              <a:avLst/>
+            </a:prstGeom>
+            <a:ln w="9525">
+              <a:solidFill>
+                <a:schemeClr val="bg1">
+                  <a:lumMod val="85000"/>
+                </a:schemeClr>
+              </a:solidFill>
+            </a:ln>
+          </p:spPr>
+          <p:style>
+            <a:lnRef idx="2">
+              <a:schemeClr val="accent1"/>
+            </a:lnRef>
+            <a:fillRef idx="0">
+              <a:schemeClr val="accent1"/>
+            </a:fillRef>
+            <a:effectRef idx="1">
+              <a:schemeClr val="accent1"/>
+            </a:effectRef>
+            <a:fontRef idx="minor">
+              <a:schemeClr val="tx1"/>
+            </a:fontRef>
+          </p:style>
+        </p:cxnSp>
+        <p:sp>
+          <p:nvSpPr>
+            <p:cNvPr id="16" name="Rectangle 23">
+              <a:extLst>
+                <a:ext uri="{FF2B5EF4-FFF2-40B4-BE49-F238E27FC236}">
+                  <a16:creationId xmlns:a16="http://schemas.microsoft.com/office/drawing/2014/main" id="{902DC474-5BCC-4188-ACDC-AD63E6B187EC}"/>
+                </a:ext>
+                <a:ext uri="{C183D7F6-B498-43B3-948B-1728B52AA6E4}">
+                  <adec:decorative xmlns:adec="http://schemas.microsoft.com/office/drawing/2017/decorative" val="1"/>
+                </a:ext>
+              </a:extLst>
+            </p:cNvPr>
+            <p:cNvSpPr/>
+            <p:nvPr>
+              <p:extLst>
+                <p:ext uri="{386F3935-93C4-4BCD-93E2-E3B085C9AB24}">
+                  <p16:designElem xmlns:p16="http://schemas.microsoft.com/office/powerpoint/2015/main" val="1"/>
+                </p:ext>
+              </p:extLst>
+            </p:nvPr>
+          </p:nvSpPr>
+          <p:spPr>
+            <a:xfrm>
+              <a:off x="9181476" y="-8467"/>
+              <a:ext cx="3007349" cy="6866467"/>
+            </a:xfrm>
+            <a:custGeom>
+              <a:avLst/>
+              <a:gdLst/>
+              <a:ahLst/>
+              <a:cxnLst/>
+              <a:rect l="l" t="t" r="r" b="b"/>
+              <a:pathLst>
+                <a:path w="3007349" h="6866467">
+                  <a:moveTo>
+                    <a:pt x="2045532" y="0"/>
+                  </a:moveTo>
+                  <a:lnTo>
+                    <a:pt x="3007349" y="0"/>
+                  </a:lnTo>
+                  <a:lnTo>
+                    <a:pt x="3007349" y="6866467"/>
+                  </a:lnTo>
+                  <a:lnTo>
+                    <a:pt x="0" y="6866467"/>
+                  </a:lnTo>
+                  <a:lnTo>
+                    <a:pt x="2045532" y="0"/>
+                  </a:lnTo>
+                  <a:close/>
+                </a:path>
+              </a:pathLst>
+            </a:custGeom>
+            <a:solidFill>
+              <a:schemeClr val="accent1">
+                <a:alpha val="30000"/>
+              </a:schemeClr>
+            </a:solidFill>
+            <a:ln>
+              <a:noFill/>
+            </a:ln>
+            <a:effectLst/>
+          </p:spPr>
+          <p:style>
+            <a:lnRef idx="1">
+              <a:schemeClr val="accent1"/>
+            </a:lnRef>
+            <a:fillRef idx="3">
+              <a:schemeClr val="accent1"/>
+            </a:fillRef>
+            <a:effectRef idx="2">
+              <a:schemeClr val="accent1"/>
+            </a:effectRef>
+            <a:fontRef idx="minor">
+              <a:schemeClr val="lt1"/>
+            </a:fontRef>
+          </p:style>
+        </p:sp>
+        <p:sp>
+          <p:nvSpPr>
+            <p:cNvPr id="17" name="Rectangle 25">
+              <a:extLst>
+                <a:ext uri="{FF2B5EF4-FFF2-40B4-BE49-F238E27FC236}">
+                  <a16:creationId xmlns:a16="http://schemas.microsoft.com/office/drawing/2014/main" id="{7B427019-8592-4032-931B-4F27104C9DE2}"/>
+                </a:ext>
+                <a:ext uri="{C183D7F6-B498-43B3-948B-1728B52AA6E4}">
+                  <adec:decorative xmlns:adec="http://schemas.microsoft.com/office/drawing/2017/decorative" val="1"/>
+                </a:ext>
+              </a:extLst>
+            </p:cNvPr>
+            <p:cNvSpPr/>
+            <p:nvPr>
+              <p:extLst>
+                <p:ext uri="{386F3935-93C4-4BCD-93E2-E3B085C9AB24}">
+                  <p16:designElem xmlns:p16="http://schemas.microsoft.com/office/powerpoint/2015/main" val="1"/>
+                </p:ext>
+              </p:extLst>
+            </p:nvPr>
+          </p:nvSpPr>
+          <p:spPr>
+            <a:xfrm>
+              <a:off x="9603442" y="-8467"/>
+              <a:ext cx="2588558" cy="6866467"/>
+            </a:xfrm>
+            <a:custGeom>
+              <a:avLst/>
+              <a:gdLst/>
+              <a:ahLst/>
+              <a:cxnLst/>
+              <a:rect l="l" t="t" r="r" b="b"/>
+              <a:pathLst>
+                <a:path w="2573311" h="6866467">
+                  <a:moveTo>
+                    <a:pt x="0" y="0"/>
+                  </a:moveTo>
+                  <a:lnTo>
+                    <a:pt x="2573311" y="0"/>
+                  </a:lnTo>
+                  <a:lnTo>
+                    <a:pt x="2573311" y="6866467"/>
+                  </a:lnTo>
+                  <a:lnTo>
+                    <a:pt x="1202336" y="6866467"/>
+                  </a:lnTo>
+                  <a:lnTo>
+                    <a:pt x="0" y="0"/>
+                  </a:lnTo>
+                  <a:close/>
+                </a:path>
+              </a:pathLst>
+            </a:custGeom>
+            <a:solidFill>
+              <a:schemeClr val="accent1">
+                <a:alpha val="20000"/>
+              </a:schemeClr>
+            </a:solidFill>
+            <a:ln>
+              <a:noFill/>
+            </a:ln>
+            <a:effectLst/>
+          </p:spPr>
+          <p:style>
+            <a:lnRef idx="1">
+              <a:schemeClr val="accent1"/>
+            </a:lnRef>
+            <a:fillRef idx="3">
+              <a:schemeClr val="accent1"/>
+            </a:fillRef>
+            <a:effectRef idx="2">
+              <a:schemeClr val="accent1"/>
+            </a:effectRef>
+            <a:fontRef idx="minor">
+              <a:schemeClr val="lt1"/>
+            </a:fontRef>
+          </p:style>
+        </p:sp>
+        <p:sp>
+          <p:nvSpPr>
+            <p:cNvPr id="18" name="Isosceles Triangle 17">
+              <a:extLst>
+                <a:ext uri="{FF2B5EF4-FFF2-40B4-BE49-F238E27FC236}">
+                  <a16:creationId xmlns:a16="http://schemas.microsoft.com/office/drawing/2014/main" id="{1D6E2CEA-A5BB-4CF7-B907-AE4DBF6748EB}"/>
+                </a:ext>
+                <a:ext uri="{C183D7F6-B498-43B3-948B-1728B52AA6E4}">
+                  <adec:decorative xmlns:adec="http://schemas.microsoft.com/office/drawing/2017/decorative" val="1"/>
+                </a:ext>
+              </a:extLst>
+            </p:cNvPr>
+            <p:cNvSpPr/>
+            <p:nvPr>
+              <p:extLst>
+                <p:ext uri="{386F3935-93C4-4BCD-93E2-E3B085C9AB24}">
+                  <p16:designElem xmlns:p16="http://schemas.microsoft.com/office/powerpoint/2015/main" val="1"/>
+                </p:ext>
+              </p:extLst>
+            </p:nvPr>
+          </p:nvSpPr>
+          <p:spPr>
+            <a:xfrm>
+              <a:off x="8932333" y="3048000"/>
+              <a:ext cx="3259667" cy="3810000"/>
+            </a:xfrm>
+            <a:prstGeom prst="triangle">
+              <a:avLst>
+                <a:gd name="adj" fmla="val 100000"/>
+              </a:avLst>
+            </a:prstGeom>
+            <a:solidFill>
+              <a:schemeClr val="accent2">
+                <a:alpha val="72000"/>
+              </a:schemeClr>
+            </a:solidFill>
+            <a:ln>
+              <a:noFill/>
+            </a:ln>
+            <a:effectLst/>
+          </p:spPr>
+          <p:style>
+            <a:lnRef idx="1">
+              <a:schemeClr val="accent1"/>
+            </a:lnRef>
+            <a:fillRef idx="3">
+              <a:schemeClr val="accent1"/>
+            </a:fillRef>
+            <a:effectRef idx="2">
+              <a:schemeClr val="accent1"/>
+            </a:effectRef>
+            <a:fontRef idx="minor">
+              <a:schemeClr val="lt1"/>
+            </a:fontRef>
+          </p:style>
+        </p:sp>
+        <p:sp>
+          <p:nvSpPr>
+            <p:cNvPr id="19" name="Rectangle 27">
+              <a:extLst>
+                <a:ext uri="{FF2B5EF4-FFF2-40B4-BE49-F238E27FC236}">
+                  <a16:creationId xmlns:a16="http://schemas.microsoft.com/office/drawing/2014/main" id="{78D09D5A-29CC-4B32-9CE1-72E607558A6C}"/>
+                </a:ext>
+                <a:ext uri="{C183D7F6-B498-43B3-948B-1728B52AA6E4}">
+                  <adec:decorative xmlns:adec="http://schemas.microsoft.com/office/drawing/2017/decorative" val="1"/>
+                </a:ext>
+              </a:extLst>
+            </p:cNvPr>
+            <p:cNvSpPr/>
+            <p:nvPr>
+              <p:extLst>
+                <p:ext uri="{386F3935-93C4-4BCD-93E2-E3B085C9AB24}">
+                  <p16:designElem xmlns:p16="http://schemas.microsoft.com/office/powerpoint/2015/main" val="1"/>
+                </p:ext>
+              </p:extLst>
+            </p:nvPr>
+          </p:nvSpPr>
+          <p:spPr>
+            <a:xfrm>
+              <a:off x="9334500" y="-8467"/>
+              <a:ext cx="2854326" cy="6866467"/>
+            </a:xfrm>
+            <a:custGeom>
+              <a:avLst/>
+              <a:gdLst/>
+              <a:ahLst/>
+              <a:cxnLst/>
+              <a:rect l="l" t="t" r="r" b="b"/>
+              <a:pathLst>
+                <a:path w="2858013" h="6866467">
+                  <a:moveTo>
+                    <a:pt x="0" y="0"/>
+                  </a:moveTo>
+                  <a:lnTo>
+                    <a:pt x="2858013" y="0"/>
+                  </a:lnTo>
+                  <a:lnTo>
+                    <a:pt x="2858013" y="6866467"/>
+                  </a:lnTo>
+                  <a:lnTo>
+                    <a:pt x="2473942" y="6866467"/>
+                  </a:lnTo>
+                  <a:lnTo>
+                    <a:pt x="0" y="0"/>
+                  </a:lnTo>
+                  <a:close/>
+                </a:path>
+              </a:pathLst>
+            </a:custGeom>
+            <a:solidFill>
+              <a:schemeClr val="accent2">
+                <a:lumMod val="75000"/>
+                <a:alpha val="70000"/>
+              </a:schemeClr>
+            </a:solidFill>
+            <a:ln>
+              <a:noFill/>
+            </a:ln>
+            <a:effectLst/>
+          </p:spPr>
+          <p:style>
+            <a:lnRef idx="1">
+              <a:schemeClr val="accent1"/>
+            </a:lnRef>
+            <a:fillRef idx="3">
+              <a:schemeClr val="accent1"/>
+            </a:fillRef>
+            <a:effectRef idx="2">
+              <a:schemeClr val="accent1"/>
+            </a:effectRef>
+            <a:fontRef idx="minor">
+              <a:schemeClr val="lt1"/>
+            </a:fontRef>
+          </p:style>
+        </p:sp>
+        <p:sp>
+          <p:nvSpPr>
+            <p:cNvPr id="20" name="Rectangle 28">
+              <a:extLst>
+                <a:ext uri="{FF2B5EF4-FFF2-40B4-BE49-F238E27FC236}">
+                  <a16:creationId xmlns:a16="http://schemas.microsoft.com/office/drawing/2014/main" id="{6DF3A3FC-950B-40B0-923D-0F0BC1A54204}"/>
+                </a:ext>
+                <a:ext uri="{C183D7F6-B498-43B3-948B-1728B52AA6E4}">
+                  <adec:decorative xmlns:adec="http://schemas.microsoft.com/office/drawing/2017/decorative" val="1"/>
+                </a:ext>
+              </a:extLst>
+            </p:cNvPr>
+            <p:cNvSpPr/>
+            <p:nvPr>
+              <p:extLst>
+                <p:ext uri="{386F3935-93C4-4BCD-93E2-E3B085C9AB24}">
+                  <p16:designElem xmlns:p16="http://schemas.microsoft.com/office/powerpoint/2015/main" val="1"/>
+                </p:ext>
+              </p:extLst>
+            </p:nvPr>
+          </p:nvSpPr>
+          <p:spPr>
+            <a:xfrm>
+              <a:off x="10898730" y="-8467"/>
+              <a:ext cx="1290094" cy="6866467"/>
+            </a:xfrm>
+            <a:custGeom>
+              <a:avLst/>
+              <a:gdLst/>
+              <a:ahLst/>
+              <a:cxnLst/>
+              <a:rect l="l" t="t" r="r" b="b"/>
+              <a:pathLst>
+                <a:path w="1290094" h="6858000">
+                  <a:moveTo>
+                    <a:pt x="1019735" y="0"/>
+                  </a:moveTo>
+                  <a:lnTo>
+                    <a:pt x="1290094" y="0"/>
+                  </a:lnTo>
+                  <a:lnTo>
+                    <a:pt x="1290094" y="6858000"/>
+                  </a:lnTo>
+                  <a:lnTo>
+                    <a:pt x="0" y="6858000"/>
+                  </a:lnTo>
+                  <a:lnTo>
+                    <a:pt x="1019735" y="0"/>
+                  </a:lnTo>
+                  <a:close/>
+                </a:path>
+              </a:pathLst>
+            </a:custGeom>
+            <a:solidFill>
+              <a:schemeClr val="accent1">
+                <a:lumMod val="60000"/>
+                <a:lumOff val="40000"/>
+                <a:alpha val="70000"/>
+              </a:schemeClr>
+            </a:solidFill>
+            <a:ln>
+              <a:noFill/>
+            </a:ln>
+            <a:effectLst/>
+          </p:spPr>
+          <p:style>
+            <a:lnRef idx="1">
+              <a:schemeClr val="accent1"/>
+            </a:lnRef>
+            <a:fillRef idx="3">
+              <a:schemeClr val="accent1"/>
+            </a:fillRef>
+            <a:effectRef idx="2">
+              <a:schemeClr val="accent1"/>
+            </a:effectRef>
+            <a:fontRef idx="minor">
+              <a:schemeClr val="lt1"/>
+            </a:fontRef>
+          </p:style>
+        </p:sp>
+        <p:sp>
+          <p:nvSpPr>
+            <p:cNvPr id="21" name="Rectangle 29">
+              <a:extLst>
+                <a:ext uri="{FF2B5EF4-FFF2-40B4-BE49-F238E27FC236}">
+                  <a16:creationId xmlns:a16="http://schemas.microsoft.com/office/drawing/2014/main" id="{BCA0F2E1-CD3D-4521-9CCB-41A5CC6C543E}"/>
+                </a:ext>
+                <a:ext uri="{C183D7F6-B498-43B3-948B-1728B52AA6E4}">
+                  <adec:decorative xmlns:adec="http://schemas.microsoft.com/office/drawing/2017/decorative" val="1"/>
+                </a:ext>
+              </a:extLst>
+            </p:cNvPr>
+            <p:cNvSpPr/>
+            <p:nvPr>
+              <p:extLst>
+                <p:ext uri="{386F3935-93C4-4BCD-93E2-E3B085C9AB24}">
+                  <p16:designElem xmlns:p16="http://schemas.microsoft.com/office/powerpoint/2015/main" val="1"/>
+                </p:ext>
+              </p:extLst>
+            </p:nvPr>
+          </p:nvSpPr>
+          <p:spPr>
+            <a:xfrm>
+              <a:off x="10938999" y="-8467"/>
+              <a:ext cx="1249825" cy="6866467"/>
+            </a:xfrm>
+            <a:custGeom>
+              <a:avLst/>
+              <a:gdLst/>
+              <a:ahLst/>
+              <a:cxnLst/>
+              <a:rect l="l" t="t" r="r" b="b"/>
+              <a:pathLst>
+                <a:path w="1249825" h="6858000">
+                  <a:moveTo>
+                    <a:pt x="0" y="0"/>
+                  </a:moveTo>
+                  <a:lnTo>
+                    <a:pt x="1249825" y="0"/>
+                  </a:lnTo>
+                  <a:lnTo>
+                    <a:pt x="1249825" y="6858000"/>
+                  </a:lnTo>
+                  <a:lnTo>
+                    <a:pt x="1109382" y="6858000"/>
+                  </a:lnTo>
+                  <a:lnTo>
+                    <a:pt x="0" y="0"/>
+                  </a:lnTo>
+                  <a:close/>
+                </a:path>
+              </a:pathLst>
+            </a:custGeom>
+            <a:solidFill>
+              <a:schemeClr val="accent1">
+                <a:alpha val="65000"/>
+              </a:schemeClr>
+            </a:solidFill>
+            <a:ln>
+              <a:noFill/>
+            </a:ln>
+            <a:effectLst/>
+          </p:spPr>
+          <p:style>
+            <a:lnRef idx="1">
+              <a:schemeClr val="accent1"/>
+            </a:lnRef>
+            <a:fillRef idx="3">
+              <a:schemeClr val="accent1"/>
+            </a:fillRef>
+            <a:effectRef idx="2">
+              <a:schemeClr val="accent1"/>
+            </a:effectRef>
+            <a:fontRef idx="minor">
+              <a:schemeClr val="lt1"/>
+            </a:fontRef>
+          </p:style>
+        </p:sp>
+        <p:sp>
+          <p:nvSpPr>
+            <p:cNvPr id="22" name="Isosceles Triangle 21">
+              <a:extLst>
+                <a:ext uri="{FF2B5EF4-FFF2-40B4-BE49-F238E27FC236}">
+                  <a16:creationId xmlns:a16="http://schemas.microsoft.com/office/drawing/2014/main" id="{9BA4F16A-21DC-462A-AD37-0A93C8B79E1E}"/>
+                </a:ext>
+                <a:ext uri="{C183D7F6-B498-43B3-948B-1728B52AA6E4}">
+                  <adec:decorative xmlns:adec="http://schemas.microsoft.com/office/drawing/2017/decorative" val="1"/>
+                </a:ext>
+              </a:extLst>
+            </p:cNvPr>
+            <p:cNvSpPr/>
+            <p:nvPr>
+              <p:extLst>
+                <p:ext uri="{386F3935-93C4-4BCD-93E2-E3B085C9AB24}">
+                  <p16:designElem xmlns:p16="http://schemas.microsoft.com/office/powerpoint/2015/main" val="1"/>
+                </p:ext>
+              </p:extLst>
+            </p:nvPr>
+          </p:nvSpPr>
+          <p:spPr>
+            <a:xfrm>
+              <a:off x="10371666" y="3589867"/>
+              <a:ext cx="1817159" cy="3268133"/>
+            </a:xfrm>
+            <a:prstGeom prst="triangle">
+              <a:avLst>
+                <a:gd name="adj" fmla="val 100000"/>
+              </a:avLst>
+            </a:prstGeom>
+            <a:solidFill>
+              <a:schemeClr val="accent1">
+                <a:alpha val="80000"/>
+              </a:schemeClr>
+            </a:solidFill>
+            <a:ln>
+              <a:noFill/>
+            </a:ln>
+            <a:effectLst/>
+          </p:spPr>
+          <p:style>
+            <a:lnRef idx="1">
+              <a:schemeClr val="accent1"/>
+            </a:lnRef>
+            <a:fillRef idx="3">
+              <a:schemeClr val="accent1"/>
+            </a:fillRef>
+            <a:effectRef idx="2">
+              <a:schemeClr val="accent1"/>
+            </a:effectRef>
+            <a:fontRef idx="minor">
+              <a:schemeClr val="lt1"/>
+            </a:fontRef>
+          </p:style>
+        </p:sp>
+        <p:sp>
+          <p:nvSpPr>
+            <p:cNvPr id="23" name="Isosceles Triangle 22">
+              <a:extLst>
+                <a:ext uri="{FF2B5EF4-FFF2-40B4-BE49-F238E27FC236}">
+                  <a16:creationId xmlns:a16="http://schemas.microsoft.com/office/drawing/2014/main" id="{FB75EBDD-038D-4572-A372-114938295706}"/>
+                </a:ext>
+                <a:ext uri="{C183D7F6-B498-43B3-948B-1728B52AA6E4}">
+                  <adec:decorative xmlns:adec="http://schemas.microsoft.com/office/drawing/2017/decorative" val="1"/>
+                </a:ext>
+              </a:extLst>
+            </p:cNvPr>
+            <p:cNvSpPr/>
+            <p:nvPr>
+              <p:extLst>
+                <p:ext uri="{386F3935-93C4-4BCD-93E2-E3B085C9AB24}">
+                  <p16:designElem xmlns:p16="http://schemas.microsoft.com/office/powerpoint/2015/main" val="1"/>
+                </p:ext>
+              </p:extLst>
+            </p:nvPr>
+          </p:nvSpPr>
+          <p:spPr>
+            <a:xfrm>
+              <a:off x="0" y="4013200"/>
+              <a:ext cx="448733" cy="2844800"/>
+            </a:xfrm>
+            <a:prstGeom prst="triangle">
+              <a:avLst>
+                <a:gd name="adj" fmla="val 0"/>
+              </a:avLst>
+            </a:prstGeom>
+            <a:solidFill>
+              <a:schemeClr val="accent1">
+                <a:alpha val="85000"/>
+              </a:schemeClr>
+            </a:solidFill>
+            <a:ln>
+              <a:noFill/>
+            </a:ln>
+            <a:effectLst/>
+          </p:spPr>
+          <p:style>
+            <a:lnRef idx="1">
+              <a:schemeClr val="accent1"/>
+            </a:lnRef>
+            <a:fillRef idx="3">
+              <a:schemeClr val="accent1"/>
+            </a:fillRef>
+            <a:effectRef idx="2">
+              <a:schemeClr val="accent1"/>
+            </a:effectRef>
+            <a:fontRef idx="minor">
+              <a:schemeClr val="lt1"/>
+            </a:fontRef>
+          </p:style>
+        </p:sp>
+      </p:grpSp>
+      <p:sp>
+        <p:nvSpPr>
+          <p:cNvPr id="25" name="Rectangle 24">
+            <a:extLst>
+              <a:ext uri="{FF2B5EF4-FFF2-40B4-BE49-F238E27FC236}">
+                <a16:creationId xmlns:a16="http://schemas.microsoft.com/office/drawing/2014/main" id="{21029ED5-F105-4DD2-99C8-1E4422817978}"/>
+              </a:ext>
+              <a:ext uri="{C183D7F6-B498-43B3-948B-1728B52AA6E4}">
+                <adec:decorative xmlns:adec="http://schemas.microsoft.com/office/drawing/2017/decorative" val="1"/>
+              </a:ext>
+            </a:extLst>
+          </p:cNvPr>
+          <p:cNvSpPr>
+            <a:spLocks noGrp="1" noRot="1" noChangeAspect="1" noMove="1" noResize="1" noEditPoints="1" noAdjustHandles="1" noChangeArrowheads="1" noChangeShapeType="1" noTextEdit="1"/>
+          </p:cNvSpPr>
+          <p:nvPr>
+            <p:extLst>
+              <p:ext uri="{386F3935-93C4-4BCD-93E2-E3B085C9AB24}">
+                <p16:designElem xmlns:p16="http://schemas.microsoft.com/office/powerpoint/2015/main" val="1"/>
+              </p:ext>
+            </p:extLst>
+          </p:nvPr>
+        </p:nvSpPr>
+        <p:spPr>
+          <a:xfrm>
+            <a:off x="0" y="0"/>
+            <a:ext cx="12192000" cy="6858000"/>
+          </a:xfrm>
+          <a:prstGeom prst="rect">
+            <a:avLst/>
+          </a:prstGeom>
+          <a:ln>
+            <a:noFill/>
+          </a:ln>
+        </p:spPr>
+        <p:style>
+          <a:lnRef idx="2">
+            <a:schemeClr val="accent1">
+              <a:shade val="50000"/>
+            </a:schemeClr>
+          </a:lnRef>
+          <a:fillRef idx="1">
+            <a:schemeClr val="accent1"/>
+          </a:fillRef>
+          <a:effectRef idx="0">
+            <a:schemeClr val="accent1"/>
+          </a:effectRef>
+          <a:fontRef idx="minor">
+            <a:schemeClr val="lt1"/>
+          </a:fontRef>
+        </p:style>
+        <p:txBody>
+          <a:bodyPr rtlCol="0" anchor="ctr"/>
+          <a:lstStyle/>
+          <a:p>
+            <a:pPr algn="ctr"/>
+            <a:endParaRPr lang="en-US"/>
+          </a:p>
+        </p:txBody>
+      </p:sp>
+      <p:grpSp>
+        <p:nvGrpSpPr>
+          <p:cNvPr id="27" name="Group 26">
+            <a:extLst>
+              <a:ext uri="{FF2B5EF4-FFF2-40B4-BE49-F238E27FC236}">
+                <a16:creationId xmlns:a16="http://schemas.microsoft.com/office/drawing/2014/main" id="{2D621E68-BF28-4A1C-B1A2-4E55E139E79A}"/>
+              </a:ext>
+              <a:ext uri="{C183D7F6-B498-43B3-948B-1728B52AA6E4}">
+                <adec:decorative xmlns:adec="http://schemas.microsoft.com/office/drawing/2017/decorative" val="1"/>
+              </a:ext>
+            </a:extLst>
+          </p:cNvPr>
+          <p:cNvGrpSpPr>
+            <a:grpSpLocks noGrp="1" noUngrp="1" noRot="1" noChangeAspect="1" noMove="1" noResize="1"/>
+          </p:cNvGrpSpPr>
+          <p:nvPr>
+            <p:extLst>
+              <p:ext uri="{386F3935-93C4-4BCD-93E2-E3B085C9AB24}">
+                <p16:designElem xmlns:p16="http://schemas.microsoft.com/office/powerpoint/2015/main" val="1"/>
+              </p:ext>
+            </p:extLst>
+          </p:nvPr>
+        </p:nvGrpSpPr>
+        <p:grpSpPr>
+          <a:xfrm>
+            <a:off x="0" y="-8467"/>
+            <a:ext cx="12192000" cy="6866467"/>
+            <a:chOff x="0" y="-8467"/>
+            <a:chExt cx="12192000" cy="6866467"/>
+          </a:xfrm>
+        </p:grpSpPr>
+        <p:cxnSp>
+          <p:nvCxnSpPr>
+            <p:cNvPr id="28" name="Straight Connector 27">
+              <a:extLst>
+                <a:ext uri="{FF2B5EF4-FFF2-40B4-BE49-F238E27FC236}">
+                  <a16:creationId xmlns:a16="http://schemas.microsoft.com/office/drawing/2014/main" id="{BE8BBE4D-F0DF-49B9-B75A-99DAC53ACA77}"/>
+                </a:ext>
+                <a:ext uri="{C183D7F6-B498-43B3-948B-1728B52AA6E4}">
+                  <adec:decorative xmlns:adec="http://schemas.microsoft.com/office/drawing/2017/decorative" val="1"/>
+                </a:ext>
+              </a:extLst>
+            </p:cNvPr>
+            <p:cNvCxnSpPr/>
+            <p:nvPr>
+              <p:extLst>
+                <p:ext uri="{386F3935-93C4-4BCD-93E2-E3B085C9AB24}">
+                  <p16:designElem xmlns:p16="http://schemas.microsoft.com/office/powerpoint/2015/main" val="1"/>
+                </p:ext>
+              </p:extLst>
+            </p:nvPr>
+          </p:nvCxnSpPr>
+          <p:spPr>
+            <a:xfrm flipH="1">
+              <a:off x="7425267" y="3681413"/>
+              <a:ext cx="4763558" cy="3176587"/>
+            </a:xfrm>
+            <a:prstGeom prst="line">
+              <a:avLst/>
+            </a:prstGeom>
+            <a:ln w="9525">
+              <a:solidFill>
+                <a:schemeClr val="bg1">
+                  <a:lumMod val="85000"/>
+                </a:schemeClr>
+              </a:solidFill>
+            </a:ln>
+          </p:spPr>
+          <p:style>
+            <a:lnRef idx="2">
+              <a:schemeClr val="accent1"/>
+            </a:lnRef>
+            <a:fillRef idx="0">
+              <a:schemeClr val="accent1"/>
+            </a:fillRef>
+            <a:effectRef idx="1">
+              <a:schemeClr val="accent1"/>
+            </a:effectRef>
+            <a:fontRef idx="minor">
+              <a:schemeClr val="tx1"/>
+            </a:fontRef>
+          </p:style>
+        </p:cxnSp>
+        <p:sp>
+          <p:nvSpPr>
+            <p:cNvPr id="29" name="Rectangle 23">
+              <a:extLst>
+                <a:ext uri="{FF2B5EF4-FFF2-40B4-BE49-F238E27FC236}">
+                  <a16:creationId xmlns:a16="http://schemas.microsoft.com/office/drawing/2014/main" id="{E0F07DDC-34A6-46A1-9DE9-2BBE2931A55B}"/>
+                </a:ext>
+                <a:ext uri="{C183D7F6-B498-43B3-948B-1728B52AA6E4}">
+                  <adec:decorative xmlns:adec="http://schemas.microsoft.com/office/drawing/2017/decorative" val="1"/>
+                </a:ext>
+              </a:extLst>
+            </p:cNvPr>
+            <p:cNvSpPr/>
+            <p:nvPr>
+              <p:extLst>
+                <p:ext uri="{386F3935-93C4-4BCD-93E2-E3B085C9AB24}">
+                  <p16:designElem xmlns:p16="http://schemas.microsoft.com/office/powerpoint/2015/main" val="1"/>
+                </p:ext>
+              </p:extLst>
+            </p:nvPr>
+          </p:nvSpPr>
+          <p:spPr>
+            <a:xfrm>
+              <a:off x="9181476" y="-8467"/>
+              <a:ext cx="3007349" cy="6866467"/>
+            </a:xfrm>
+            <a:custGeom>
+              <a:avLst/>
+              <a:gdLst/>
+              <a:ahLst/>
+              <a:cxnLst/>
+              <a:rect l="l" t="t" r="r" b="b"/>
+              <a:pathLst>
+                <a:path w="3007349" h="6866467">
+                  <a:moveTo>
+                    <a:pt x="2045532" y="0"/>
+                  </a:moveTo>
+                  <a:lnTo>
+                    <a:pt x="3007349" y="0"/>
+                  </a:lnTo>
+                  <a:lnTo>
+                    <a:pt x="3007349" y="6866467"/>
+                  </a:lnTo>
+                  <a:lnTo>
+                    <a:pt x="0" y="6866467"/>
+                  </a:lnTo>
+                  <a:lnTo>
+                    <a:pt x="2045532" y="0"/>
+                  </a:lnTo>
+                  <a:close/>
+                </a:path>
+              </a:pathLst>
+            </a:custGeom>
+            <a:solidFill>
+              <a:schemeClr val="accent1">
+                <a:alpha val="30000"/>
+              </a:schemeClr>
+            </a:solidFill>
+            <a:ln>
+              <a:noFill/>
+            </a:ln>
+            <a:effectLst/>
+          </p:spPr>
+          <p:style>
+            <a:lnRef idx="1">
+              <a:schemeClr val="accent1"/>
+            </a:lnRef>
+            <a:fillRef idx="3">
+              <a:schemeClr val="accent1"/>
+            </a:fillRef>
+            <a:effectRef idx="2">
+              <a:schemeClr val="accent1"/>
+            </a:effectRef>
+            <a:fontRef idx="minor">
+              <a:schemeClr val="lt1"/>
+            </a:fontRef>
+          </p:style>
+        </p:sp>
+        <p:sp>
+          <p:nvSpPr>
+            <p:cNvPr id="30" name="Rectangle 25">
+              <a:extLst>
+                <a:ext uri="{FF2B5EF4-FFF2-40B4-BE49-F238E27FC236}">
+                  <a16:creationId xmlns:a16="http://schemas.microsoft.com/office/drawing/2014/main" id="{2CEB2BF9-B8DB-45B9-86EA-D197B5B1AEFF}"/>
+                </a:ext>
+                <a:ext uri="{C183D7F6-B498-43B3-948B-1728B52AA6E4}">
+                  <adec:decorative xmlns:adec="http://schemas.microsoft.com/office/drawing/2017/decorative" val="1"/>
+                </a:ext>
+              </a:extLst>
+            </p:cNvPr>
+            <p:cNvSpPr/>
+            <p:nvPr>
+              <p:extLst>
+                <p:ext uri="{386F3935-93C4-4BCD-93E2-E3B085C9AB24}">
+                  <p16:designElem xmlns:p16="http://schemas.microsoft.com/office/powerpoint/2015/main" val="1"/>
+                </p:ext>
+              </p:extLst>
+            </p:nvPr>
+          </p:nvSpPr>
+          <p:spPr>
+            <a:xfrm>
+              <a:off x="9603442" y="-8467"/>
+              <a:ext cx="2588558" cy="6866467"/>
+            </a:xfrm>
+            <a:custGeom>
+              <a:avLst/>
+              <a:gdLst/>
+              <a:ahLst/>
+              <a:cxnLst/>
+              <a:rect l="l" t="t" r="r" b="b"/>
+              <a:pathLst>
+                <a:path w="2573311" h="6866467">
+                  <a:moveTo>
+                    <a:pt x="0" y="0"/>
+                  </a:moveTo>
+                  <a:lnTo>
+                    <a:pt x="2573311" y="0"/>
+                  </a:lnTo>
+                  <a:lnTo>
+                    <a:pt x="2573311" y="6866467"/>
+                  </a:lnTo>
+                  <a:lnTo>
+                    <a:pt x="1202336" y="6866467"/>
+                  </a:lnTo>
+                  <a:lnTo>
+                    <a:pt x="0" y="0"/>
+                  </a:lnTo>
+                  <a:close/>
+                </a:path>
+              </a:pathLst>
+            </a:custGeom>
+            <a:solidFill>
+              <a:schemeClr val="accent1">
+                <a:alpha val="20000"/>
+              </a:schemeClr>
+            </a:solidFill>
+            <a:ln>
+              <a:noFill/>
+            </a:ln>
+            <a:effectLst/>
+          </p:spPr>
+          <p:style>
+            <a:lnRef idx="1">
+              <a:schemeClr val="accent1"/>
+            </a:lnRef>
+            <a:fillRef idx="3">
+              <a:schemeClr val="accent1"/>
+            </a:fillRef>
+            <a:effectRef idx="2">
+              <a:schemeClr val="accent1"/>
+            </a:effectRef>
+            <a:fontRef idx="minor">
+              <a:schemeClr val="lt1"/>
+            </a:fontRef>
+          </p:style>
+        </p:sp>
+        <p:sp>
+          <p:nvSpPr>
+            <p:cNvPr id="31" name="Isosceles Triangle 30">
+              <a:extLst>
+                <a:ext uri="{FF2B5EF4-FFF2-40B4-BE49-F238E27FC236}">
+                  <a16:creationId xmlns:a16="http://schemas.microsoft.com/office/drawing/2014/main" id="{08B5BB34-3801-4E70-A981-FE007635E11D}"/>
+                </a:ext>
+                <a:ext uri="{C183D7F6-B498-43B3-948B-1728B52AA6E4}">
+                  <adec:decorative xmlns:adec="http://schemas.microsoft.com/office/drawing/2017/decorative" val="1"/>
+                </a:ext>
+              </a:extLst>
+            </p:cNvPr>
+            <p:cNvSpPr/>
+            <p:nvPr>
+              <p:extLst>
+                <p:ext uri="{386F3935-93C4-4BCD-93E2-E3B085C9AB24}">
+                  <p16:designElem xmlns:p16="http://schemas.microsoft.com/office/powerpoint/2015/main" val="1"/>
+                </p:ext>
+              </p:extLst>
+            </p:nvPr>
+          </p:nvSpPr>
+          <p:spPr>
+            <a:xfrm>
+              <a:off x="8932333" y="3048000"/>
+              <a:ext cx="3259667" cy="3810000"/>
+            </a:xfrm>
+            <a:prstGeom prst="triangle">
+              <a:avLst>
+                <a:gd name="adj" fmla="val 100000"/>
+              </a:avLst>
+            </a:prstGeom>
+            <a:solidFill>
+              <a:schemeClr val="accent2">
+                <a:alpha val="72000"/>
+              </a:schemeClr>
+            </a:solidFill>
+            <a:ln>
+              <a:noFill/>
+            </a:ln>
+            <a:effectLst/>
+          </p:spPr>
+          <p:style>
+            <a:lnRef idx="1">
+              <a:schemeClr val="accent1"/>
+            </a:lnRef>
+            <a:fillRef idx="3">
+              <a:schemeClr val="accent1"/>
+            </a:fillRef>
+            <a:effectRef idx="2">
+              <a:schemeClr val="accent1"/>
+            </a:effectRef>
+            <a:fontRef idx="minor">
+              <a:schemeClr val="lt1"/>
+            </a:fontRef>
+          </p:style>
+        </p:sp>
+        <p:sp>
+          <p:nvSpPr>
+            <p:cNvPr id="32" name="Rectangle 27">
+              <a:extLst>
+                <a:ext uri="{FF2B5EF4-FFF2-40B4-BE49-F238E27FC236}">
+                  <a16:creationId xmlns:a16="http://schemas.microsoft.com/office/drawing/2014/main" id="{38432A75-2CEB-463C-A8F2-ABB50A79F444}"/>
+                </a:ext>
+                <a:ext uri="{C183D7F6-B498-43B3-948B-1728B52AA6E4}">
+                  <adec:decorative xmlns:adec="http://schemas.microsoft.com/office/drawing/2017/decorative" val="1"/>
+                </a:ext>
+              </a:extLst>
+            </p:cNvPr>
+            <p:cNvSpPr/>
+            <p:nvPr>
+              <p:extLst>
+                <p:ext uri="{386F3935-93C4-4BCD-93E2-E3B085C9AB24}">
+                  <p16:designElem xmlns:p16="http://schemas.microsoft.com/office/powerpoint/2015/main" val="1"/>
+                </p:ext>
+              </p:extLst>
+            </p:nvPr>
+          </p:nvSpPr>
+          <p:spPr>
+            <a:xfrm>
+              <a:off x="9334500" y="-8467"/>
+              <a:ext cx="2854326" cy="6866467"/>
+            </a:xfrm>
+            <a:custGeom>
+              <a:avLst/>
+              <a:gdLst/>
+              <a:ahLst/>
+              <a:cxnLst/>
+              <a:rect l="l" t="t" r="r" b="b"/>
+              <a:pathLst>
+                <a:path w="2858013" h="6866467">
+                  <a:moveTo>
+                    <a:pt x="0" y="0"/>
+                  </a:moveTo>
+                  <a:lnTo>
+                    <a:pt x="2858013" y="0"/>
+                  </a:lnTo>
+                  <a:lnTo>
+                    <a:pt x="2858013" y="6866467"/>
+                  </a:lnTo>
+                  <a:lnTo>
+                    <a:pt x="2473942" y="6866467"/>
+                  </a:lnTo>
+                  <a:lnTo>
+                    <a:pt x="0" y="0"/>
+                  </a:lnTo>
+                  <a:close/>
+                </a:path>
+              </a:pathLst>
+            </a:custGeom>
+            <a:solidFill>
+              <a:schemeClr val="accent2">
+                <a:lumMod val="75000"/>
+                <a:alpha val="70000"/>
+              </a:schemeClr>
+            </a:solidFill>
+            <a:ln>
+              <a:noFill/>
+            </a:ln>
+            <a:effectLst/>
+          </p:spPr>
+          <p:style>
+            <a:lnRef idx="1">
+              <a:schemeClr val="accent1"/>
+            </a:lnRef>
+            <a:fillRef idx="3">
+              <a:schemeClr val="accent1"/>
+            </a:fillRef>
+            <a:effectRef idx="2">
+              <a:schemeClr val="accent1"/>
+            </a:effectRef>
+            <a:fontRef idx="minor">
+              <a:schemeClr val="lt1"/>
+            </a:fontRef>
+          </p:style>
+        </p:sp>
+        <p:sp>
+          <p:nvSpPr>
+            <p:cNvPr id="33" name="Rectangle 28">
+              <a:extLst>
+                <a:ext uri="{FF2B5EF4-FFF2-40B4-BE49-F238E27FC236}">
+                  <a16:creationId xmlns:a16="http://schemas.microsoft.com/office/drawing/2014/main" id="{E7E850B8-C050-4597-8BEB-113FEC9A27C9}"/>
+                </a:ext>
+                <a:ext uri="{C183D7F6-B498-43B3-948B-1728B52AA6E4}">
+                  <adec:decorative xmlns:adec="http://schemas.microsoft.com/office/drawing/2017/decorative" val="1"/>
+                </a:ext>
+              </a:extLst>
+            </p:cNvPr>
+            <p:cNvSpPr/>
+            <p:nvPr>
+              <p:extLst>
+                <p:ext uri="{386F3935-93C4-4BCD-93E2-E3B085C9AB24}">
+                  <p16:designElem xmlns:p16="http://schemas.microsoft.com/office/powerpoint/2015/main" val="1"/>
+                </p:ext>
+              </p:extLst>
+            </p:nvPr>
+          </p:nvSpPr>
+          <p:spPr>
+            <a:xfrm>
+              <a:off x="10898730" y="-8467"/>
+              <a:ext cx="1290094" cy="6866467"/>
+            </a:xfrm>
+            <a:custGeom>
+              <a:avLst/>
+              <a:gdLst/>
+              <a:ahLst/>
+              <a:cxnLst/>
+              <a:rect l="l" t="t" r="r" b="b"/>
+              <a:pathLst>
+                <a:path w="1290094" h="6858000">
+                  <a:moveTo>
+                    <a:pt x="1019735" y="0"/>
+                  </a:moveTo>
+                  <a:lnTo>
+                    <a:pt x="1290094" y="0"/>
+                  </a:lnTo>
+                  <a:lnTo>
+                    <a:pt x="1290094" y="6858000"/>
+                  </a:lnTo>
+                  <a:lnTo>
+                    <a:pt x="0" y="6858000"/>
+                  </a:lnTo>
+                  <a:lnTo>
+                    <a:pt x="1019735" y="0"/>
+                  </a:lnTo>
+                  <a:close/>
+                </a:path>
+              </a:pathLst>
+            </a:custGeom>
+            <a:solidFill>
+              <a:schemeClr val="accent1">
+                <a:lumMod val="60000"/>
+                <a:lumOff val="40000"/>
+                <a:alpha val="70000"/>
+              </a:schemeClr>
+            </a:solidFill>
+            <a:ln>
+              <a:noFill/>
+            </a:ln>
+            <a:effectLst/>
+          </p:spPr>
+          <p:style>
+            <a:lnRef idx="1">
+              <a:schemeClr val="accent1"/>
+            </a:lnRef>
+            <a:fillRef idx="3">
+              <a:schemeClr val="accent1"/>
+            </a:fillRef>
+            <a:effectRef idx="2">
+              <a:schemeClr val="accent1"/>
+            </a:effectRef>
+            <a:fontRef idx="minor">
+              <a:schemeClr val="lt1"/>
+            </a:fontRef>
+          </p:style>
+        </p:sp>
+        <p:sp>
+          <p:nvSpPr>
+            <p:cNvPr id="34" name="Rectangle 29">
+              <a:extLst>
+                <a:ext uri="{FF2B5EF4-FFF2-40B4-BE49-F238E27FC236}">
+                  <a16:creationId xmlns:a16="http://schemas.microsoft.com/office/drawing/2014/main" id="{24ACC798-9CEC-4B6F-A8DD-F8E6FCCCF164}"/>
+                </a:ext>
+                <a:ext uri="{C183D7F6-B498-43B3-948B-1728B52AA6E4}">
+                  <adec:decorative xmlns:adec="http://schemas.microsoft.com/office/drawing/2017/decorative" val="1"/>
+                </a:ext>
+              </a:extLst>
+            </p:cNvPr>
+            <p:cNvSpPr/>
+            <p:nvPr>
+              <p:extLst>
+                <p:ext uri="{386F3935-93C4-4BCD-93E2-E3B085C9AB24}">
+                  <p16:designElem xmlns:p16="http://schemas.microsoft.com/office/powerpoint/2015/main" val="1"/>
+                </p:ext>
+              </p:extLst>
+            </p:nvPr>
+          </p:nvSpPr>
+          <p:spPr>
+            <a:xfrm>
+              <a:off x="10938999" y="-8467"/>
+              <a:ext cx="1249825" cy="6866467"/>
+            </a:xfrm>
+            <a:custGeom>
+              <a:avLst/>
+              <a:gdLst/>
+              <a:ahLst/>
+              <a:cxnLst/>
+              <a:rect l="l" t="t" r="r" b="b"/>
+              <a:pathLst>
+                <a:path w="1249825" h="6858000">
+                  <a:moveTo>
+                    <a:pt x="0" y="0"/>
+                  </a:moveTo>
+                  <a:lnTo>
+                    <a:pt x="1249825" y="0"/>
+                  </a:lnTo>
+                  <a:lnTo>
+                    <a:pt x="1249825" y="6858000"/>
+                  </a:lnTo>
+                  <a:lnTo>
+                    <a:pt x="1109382" y="6858000"/>
+                  </a:lnTo>
+                  <a:lnTo>
+                    <a:pt x="0" y="0"/>
+                  </a:lnTo>
+                  <a:close/>
+                </a:path>
+              </a:pathLst>
+            </a:custGeom>
+            <a:solidFill>
+              <a:schemeClr val="accent1">
+                <a:alpha val="65000"/>
+              </a:schemeClr>
+            </a:solidFill>
+            <a:ln>
+              <a:noFill/>
+            </a:ln>
+            <a:effectLst/>
+          </p:spPr>
+          <p:style>
+            <a:lnRef idx="1">
+              <a:schemeClr val="accent1"/>
+            </a:lnRef>
+            <a:fillRef idx="3">
+              <a:schemeClr val="accent1"/>
+            </a:fillRef>
+            <a:effectRef idx="2">
+              <a:schemeClr val="accent1"/>
+            </a:effectRef>
+            <a:fontRef idx="minor">
+              <a:schemeClr val="lt1"/>
+            </a:fontRef>
+          </p:style>
+        </p:sp>
+        <p:sp>
+          <p:nvSpPr>
+            <p:cNvPr id="35" name="Isosceles Triangle 34">
+              <a:extLst>
+                <a:ext uri="{FF2B5EF4-FFF2-40B4-BE49-F238E27FC236}">
+                  <a16:creationId xmlns:a16="http://schemas.microsoft.com/office/drawing/2014/main" id="{1D58A8C6-1294-4CD9-89BC-F1E981A524AA}"/>
+                </a:ext>
+                <a:ext uri="{C183D7F6-B498-43B3-948B-1728B52AA6E4}">
+                  <adec:decorative xmlns:adec="http://schemas.microsoft.com/office/drawing/2017/decorative" val="1"/>
+                </a:ext>
+              </a:extLst>
+            </p:cNvPr>
+            <p:cNvSpPr/>
+            <p:nvPr>
+              <p:extLst>
+                <p:ext uri="{386F3935-93C4-4BCD-93E2-E3B085C9AB24}">
+                  <p16:designElem xmlns:p16="http://schemas.microsoft.com/office/powerpoint/2015/main" val="1"/>
+                </p:ext>
+              </p:extLst>
+            </p:nvPr>
+          </p:nvSpPr>
+          <p:spPr>
+            <a:xfrm>
+              <a:off x="10371666" y="3589867"/>
+              <a:ext cx="1817159" cy="3268133"/>
+            </a:xfrm>
+            <a:prstGeom prst="triangle">
+              <a:avLst>
+                <a:gd name="adj" fmla="val 100000"/>
+              </a:avLst>
+            </a:prstGeom>
+            <a:solidFill>
+              <a:schemeClr val="accent1">
+                <a:alpha val="80000"/>
+              </a:schemeClr>
+            </a:solidFill>
+            <a:ln>
+              <a:noFill/>
+            </a:ln>
+            <a:effectLst/>
+          </p:spPr>
+          <p:style>
+            <a:lnRef idx="1">
+              <a:schemeClr val="accent1"/>
+            </a:lnRef>
+            <a:fillRef idx="3">
+              <a:schemeClr val="accent1"/>
+            </a:fillRef>
+            <a:effectRef idx="2">
+              <a:schemeClr val="accent1"/>
+            </a:effectRef>
+            <a:fontRef idx="minor">
+              <a:schemeClr val="lt1"/>
+            </a:fontRef>
+          </p:style>
+        </p:sp>
+        <p:sp>
+          <p:nvSpPr>
+            <p:cNvPr id="36" name="Isosceles Triangle 35">
+              <a:extLst>
+                <a:ext uri="{FF2B5EF4-FFF2-40B4-BE49-F238E27FC236}">
+                  <a16:creationId xmlns:a16="http://schemas.microsoft.com/office/drawing/2014/main" id="{F32F2ED6-6143-46C4-A641-72D42732B6FA}"/>
+                </a:ext>
+                <a:ext uri="{C183D7F6-B498-43B3-948B-1728B52AA6E4}">
+                  <adec:decorative xmlns:adec="http://schemas.microsoft.com/office/drawing/2017/decorative" val="1"/>
+                </a:ext>
+              </a:extLst>
+            </p:cNvPr>
+            <p:cNvSpPr/>
+            <p:nvPr>
+              <p:extLst>
+                <p:ext uri="{386F3935-93C4-4BCD-93E2-E3B085C9AB24}">
+                  <p16:designElem xmlns:p16="http://schemas.microsoft.com/office/powerpoint/2015/main" val="1"/>
+                </p:ext>
+              </p:extLst>
+            </p:nvPr>
+          </p:nvSpPr>
+          <p:spPr>
+            <a:xfrm>
+              <a:off x="0" y="4013200"/>
+              <a:ext cx="448733" cy="2844800"/>
+            </a:xfrm>
+            <a:prstGeom prst="triangle">
+              <a:avLst>
+                <a:gd name="adj" fmla="val 0"/>
+              </a:avLst>
+            </a:prstGeom>
+            <a:solidFill>
+              <a:schemeClr val="accent1">
+                <a:alpha val="85000"/>
+              </a:schemeClr>
+            </a:solidFill>
+            <a:ln>
+              <a:noFill/>
+            </a:ln>
+            <a:effectLst/>
+          </p:spPr>
+          <p:style>
+            <a:lnRef idx="1">
+              <a:schemeClr val="accent1"/>
+            </a:lnRef>
+            <a:fillRef idx="3">
+              <a:schemeClr val="accent1"/>
+            </a:fillRef>
+            <a:effectRef idx="2">
+              <a:schemeClr val="accent1"/>
+            </a:effectRef>
+            <a:fontRef idx="minor">
+              <a:schemeClr val="lt1"/>
+            </a:fontRef>
+          </p:style>
+        </p:sp>
+      </p:grpSp>
+      <p:sp>
+        <p:nvSpPr>
+          <p:cNvPr id="38" name="Rectangle 37">
+            <a:extLst>
+              <a:ext uri="{FF2B5EF4-FFF2-40B4-BE49-F238E27FC236}">
+                <a16:creationId xmlns:a16="http://schemas.microsoft.com/office/drawing/2014/main" id="{5C9652B3-A450-4ED6-8FBF-F536BA60B4D8}"/>
+              </a:ext>
+              <a:ext uri="{C183D7F6-B498-43B3-948B-1728B52AA6E4}">
+                <adec:decorative xmlns:adec="http://schemas.microsoft.com/office/drawing/2017/decorative" val="1"/>
+              </a:ext>
+            </a:extLst>
+          </p:cNvPr>
+          <p:cNvSpPr>
+            <a:spLocks noGrp="1" noRot="1" noChangeAspect="1" noMove="1" noResize="1" noEditPoints="1" noAdjustHandles="1" noChangeArrowheads="1" noChangeShapeType="1" noTextEdit="1"/>
+          </p:cNvSpPr>
+          <p:nvPr>
+            <p:extLst>
+              <p:ext uri="{386F3935-93C4-4BCD-93E2-E3B085C9AB24}">
+                <p16:designElem xmlns:p16="http://schemas.microsoft.com/office/powerpoint/2015/main" val="1"/>
+              </p:ext>
+            </p:extLst>
+          </p:nvPr>
+        </p:nvSpPr>
+        <p:spPr>
+          <a:xfrm>
+            <a:off x="477012" y="480060"/>
+            <a:ext cx="11237976" cy="5897880"/>
+          </a:xfrm>
+          <a:prstGeom prst="rect">
+            <a:avLst/>
+          </a:prstGeom>
+          <a:solidFill>
+            <a:srgbClr val="FFFFFF"/>
+          </a:solidFill>
+          <a:ln w="22225">
+            <a:solidFill>
+              <a:srgbClr val="FFFFFF"/>
+            </a:solidFill>
+          </a:ln>
+        </p:spPr>
+        <p:style>
+          <a:lnRef idx="2">
+            <a:schemeClr val="accent1">
+              <a:shade val="50000"/>
+            </a:schemeClr>
+          </a:lnRef>
+          <a:fillRef idx="1">
+            <a:schemeClr val="accent1"/>
+          </a:fillRef>
+          <a:effectRef idx="0">
+            <a:schemeClr val="accent1"/>
+          </a:effectRef>
+          <a:fontRef idx="minor">
+            <a:schemeClr val="lt1"/>
+          </a:fontRef>
+        </p:style>
+        <p:txBody>
+          <a:bodyPr rtlCol="0" anchor="ctr"/>
+          <a:lstStyle/>
+          <a:p>
+            <a:pPr algn="ctr"/>
+            <a:endParaRPr lang="en-US"/>
+          </a:p>
+        </p:txBody>
+      </p:sp>
+      <p:pic>
+        <p:nvPicPr>
+          <p:cNvPr id="8" name="Picture 7">
+            <a:extLst>
+              <a:ext uri="{FF2B5EF4-FFF2-40B4-BE49-F238E27FC236}">
+                <a16:creationId xmlns:a16="http://schemas.microsoft.com/office/drawing/2014/main" id="{40791FBB-E334-1727-83ED-F3ED19F83290}"/>
+              </a:ext>
+            </a:extLst>
+          </p:cNvPr>
+          <p:cNvPicPr>
+            <a:picLocks noChangeAspect="1"/>
+          </p:cNvPicPr>
+          <p:nvPr/>
+        </p:nvPicPr>
+        <p:blipFill rotWithShape="1">
+          <a:blip r:embed="rId2"/>
+          <a:srcRect t="6580" r="1" b="1518"/>
+          <a:stretch/>
+        </p:blipFill>
+        <p:spPr>
+          <a:xfrm>
+            <a:off x="568452" y="571500"/>
+            <a:ext cx="11055096" cy="5715000"/>
+          </a:xfrm>
+          <a:prstGeom prst="rect">
+            <a:avLst/>
+          </a:prstGeom>
+        </p:spPr>
+      </p:pic>
+      <p:sp>
+        <p:nvSpPr>
+          <p:cNvPr id="5" name="Footer Placeholder 4">
+            <a:extLst>
+              <a:ext uri="{FF2B5EF4-FFF2-40B4-BE49-F238E27FC236}">
+                <a16:creationId xmlns:a16="http://schemas.microsoft.com/office/drawing/2014/main" id="{D2F4932C-8E70-6C61-472A-8664D508B5B3}"/>
+              </a:ext>
+            </a:extLst>
+          </p:cNvPr>
+          <p:cNvSpPr>
+            <a:spLocks noGrp="1"/>
+          </p:cNvSpPr>
+          <p:nvPr>
+            <p:ph type="ftr" sz="quarter" idx="11"/>
+          </p:nvPr>
+        </p:nvSpPr>
+        <p:spPr>
+          <a:xfrm>
+            <a:off x="677333" y="6420107"/>
+            <a:ext cx="5142441" cy="365125"/>
+          </a:xfrm>
+        </p:spPr>
+        <p:txBody>
+          <a:bodyPr vert="horz" lIns="91440" tIns="45720" rIns="91440" bIns="45720" rtlCol="0" anchor="ctr">
+            <a:normAutofit/>
+          </a:bodyPr>
+          <a:lstStyle/>
+          <a:p>
+            <a:pPr>
+              <a:spcAft>
+                <a:spcPts val="600"/>
+              </a:spcAft>
+            </a:pPr>
+            <a:r>
+              <a:rPr lang="en-US" kern="1200">
+                <a:solidFill>
+                  <a:srgbClr val="FFFFFF"/>
+                </a:solidFill>
+                <a:latin typeface="+mn-lt"/>
+                <a:ea typeface="+mn-ea"/>
+                <a:cs typeface="+mn-cs"/>
+              </a:rPr>
+              <a:t>Microsoft Corporation</a:t>
+            </a:r>
+          </a:p>
+        </p:txBody>
+      </p:sp>
+      <p:sp>
+        <p:nvSpPr>
+          <p:cNvPr id="4" name="Date Placeholder 3">
+            <a:extLst>
+              <a:ext uri="{FF2B5EF4-FFF2-40B4-BE49-F238E27FC236}">
+                <a16:creationId xmlns:a16="http://schemas.microsoft.com/office/drawing/2014/main" id="{C9C4F83E-45A0-72F8-1297-FE131A130C23}"/>
+              </a:ext>
+            </a:extLst>
+          </p:cNvPr>
+          <p:cNvSpPr>
+            <a:spLocks noGrp="1"/>
+          </p:cNvSpPr>
+          <p:nvPr>
+            <p:ph type="dt" sz="half" idx="10"/>
+          </p:nvPr>
+        </p:nvSpPr>
+        <p:spPr>
+          <a:xfrm>
+            <a:off x="6152556" y="6420107"/>
+            <a:ext cx="4305893" cy="365125"/>
+          </a:xfrm>
+        </p:spPr>
+        <p:txBody>
+          <a:bodyPr vert="horz" lIns="91440" tIns="45720" rIns="91440" bIns="45720" rtlCol="0" anchor="ctr">
+            <a:normAutofit/>
+          </a:bodyPr>
+          <a:lstStyle/>
+          <a:p>
+            <a:pPr>
+              <a:spcAft>
+                <a:spcPts val="600"/>
+              </a:spcAft>
+            </a:pPr>
+            <a:r>
+              <a:rPr lang="en-US">
+                <a:solidFill>
+                  <a:srgbClr val="FFFFFF"/>
+                </a:solidFill>
+              </a:rPr>
+              <a:t>jun 2022.</a:t>
+            </a:r>
+          </a:p>
+        </p:txBody>
+      </p:sp>
+      <p:sp>
+        <p:nvSpPr>
+          <p:cNvPr id="6" name="Slide Number Placeholder 5">
+            <a:extLst>
+              <a:ext uri="{FF2B5EF4-FFF2-40B4-BE49-F238E27FC236}">
+                <a16:creationId xmlns:a16="http://schemas.microsoft.com/office/drawing/2014/main" id="{AEB9C0DD-C340-A529-6440-A7FDBEC2856D}"/>
+              </a:ext>
+            </a:extLst>
+          </p:cNvPr>
+          <p:cNvSpPr>
+            <a:spLocks noGrp="1"/>
+          </p:cNvSpPr>
+          <p:nvPr>
+            <p:ph type="sldNum" sz="quarter" idx="12"/>
+          </p:nvPr>
+        </p:nvSpPr>
+        <p:spPr>
+          <a:xfrm>
+            <a:off x="10860438" y="6420107"/>
+            <a:ext cx="683339" cy="365125"/>
+          </a:xfrm>
+        </p:spPr>
+        <p:txBody>
+          <a:bodyPr vert="horz" lIns="91440" tIns="45720" rIns="91440" bIns="45720" rtlCol="0" anchor="ctr">
+            <a:normAutofit/>
+          </a:bodyPr>
+          <a:lstStyle/>
+          <a:p>
+            <a:pPr>
+              <a:spcAft>
+                <a:spcPts val="600"/>
+              </a:spcAft>
+            </a:pPr>
+            <a:fld id="{250E9F36-6C21-4A52-9634-81CC1425D2B6}" type="slidenum">
+              <a:rPr lang="en-US">
+                <a:solidFill>
+                  <a:srgbClr val="FFFFFF"/>
+                </a:solidFill>
+              </a:rPr>
+              <a:pPr>
+                <a:spcAft>
+                  <a:spcPts val="600"/>
+                </a:spcAft>
+              </a:pPr>
+              <a:t>12</a:t>
+            </a:fld>
+            <a:endParaRPr lang="en-US">
+              <a:solidFill>
+                <a:srgbClr val="FFFFFF"/>
+              </a:solidFill>
+            </a:endParaRPr>
+          </a:p>
+        </p:txBody>
+      </p:sp>
+    </p:spTree>
+    <p:extLst>
+      <p:ext uri="{BB962C8B-B14F-4D97-AF65-F5344CB8AC3E}">
+        <p14:creationId xmlns:p14="http://schemas.microsoft.com/office/powerpoint/2010/main" val="1053785026"/>
+      </p:ext>
+    </p:extLst>
+  </p:cSld>
+  <p:clrMapOvr>
+    <a:masterClrMapping/>
+  </p:clrMapOvr>
+</p:sld>
+</file>
+
 <file path=ppt/slides/slide2.xml><?xml version="1.0" encoding="utf-8"?>
 <p:sld xmlns:a="http://schemas.openxmlformats.org/drawingml/2006/main" xmlns:r="http://schemas.openxmlformats.org/officeDocument/2006/relationships" xmlns:p="http://schemas.openxmlformats.org/presentationml/2006/main">
   <p:cSld>
@@ -8124,13 +11484,15 @@
           <a:p>
             <a:r>
               <a:rPr lang="sr-Latn-RS" dirty="0"/>
-              <a:t>Za praćenje kursa, apsolutno je u redu koristiti i Visual Studi 2019, jer je razvojni stek korišćen u kursu takođe podržan u toj verziji</a:t>
+              <a:t>Za praćenje kursa, moguće je koristiti i druga okruženja, ali ih je teže inicijalno podesiti – najjednostavnije je koristiti </a:t>
             </a:r>
-          </a:p>
-          <a:p>
+            <a:r>
+              <a:rPr lang="sr-Latn-RS" i="1" dirty="0"/>
+              <a:t>VS2022</a:t>
+            </a:r>
             <a:r>
               <a:rPr lang="sr-Latn-RS" dirty="0"/>
-              <a:t>Mada, ukoliko ste u mogućnosti, preporučuje se (prelazak) na 2022</a:t>
+              <a:t> (to je i preporuka)</a:t>
             </a:r>
           </a:p>
           <a:p>
@@ -8160,7 +11522,15 @@
             </a:r>
             <a:r>
               <a:rPr lang="sr-Latn-RS" dirty="0"/>
-              <a:t>2019,</a:t>
+              <a:t>neko drugo okruženje (što uključuje i starije verzije </a:t>
+            </a:r>
+            <a:r>
+              <a:rPr lang="sr-Latn-RS" i="1" dirty="0"/>
+              <a:t>VS</a:t>
+            </a:r>
+            <a:r>
+              <a:rPr lang="sr-Latn-RS" dirty="0"/>
+              <a:t>-a),</a:t>
             </a:r>
             <a:r>
               <a:rPr lang="en-US" dirty="0"/>
@@ -8184,19 +11554,19 @@
             </a:r>
             <a:r>
               <a:rPr lang="sr-Latn-RS" dirty="0"/>
-              <a:t>koje budu korišćene samo malo drugačije izledaju ili se nalaze na drugom mestu u samom okruženju, međutim postižu isti efekat</a:t>
+              <a:t>koje budu korišćene mogu drugačije da izgledaju, ili se nalaze na drugom mestu u samom okruženju, međutim, postižu isti ili sličan efekat (koji je ok)</a:t>
             </a:r>
           </a:p>
           <a:p>
             <a:r>
               <a:rPr lang="sr-Latn-RS" dirty="0"/>
-              <a:t>Prilikom instalacije okruženja (verzija nije bitna), zapravo će se VSInstaller prvo instalirati, čija je dalja uloga da instalira samo okruženje, ali i dodatke/alate/tehnologije za razvoj</a:t>
+              <a:t>Prilikom instalacije okruženja, zapravo će se VSInstaller prvo instalirati, čija je dalja uloga da instalira samo okruženje, ali i dodatke/alate/tehnologije za razvoj</a:t>
             </a:r>
           </a:p>
           <a:p>
             <a:r>
               <a:rPr lang="sr-Latn-RS" dirty="0"/>
-              <a:t>U ovom dokumentu, smatraće se da već imate VSInstaller (ukoliko ne, instalacija je trivijalna), pomoću kog naknadno možete u svakom mometu dodati željene razvojne tehnologije</a:t>
+              <a:t>U ovom dokumentu, smatraće se da već imate VSInstaller (ukoliko ne, instalacija je trivijalna – preuzimanjem sa linka iznad), pomoću kog naknadno možete u svakom mometu dodati željene razvojne tehnologije</a:t>
             </a:r>
             <a:endParaRPr lang="en-US" dirty="0"/>
           </a:p>
@@ -13740,8 +17110,8 @@
         </p:nvSpPr>
         <p:spPr>
           <a:xfrm>
-            <a:off x="677334" y="1884217"/>
-            <a:ext cx="8596668" cy="4157145"/>
+            <a:off x="677334" y="1478423"/>
+            <a:ext cx="8596668" cy="4562940"/>
           </a:xfrm>
         </p:spPr>
         <p:txBody>
@@ -13762,13 +17132,13 @@
           <a:p>
             <a:r>
               <a:rPr lang="sr-Latn-RS" dirty="0"/>
-              <a:t>Potom, prošitiri odeljak „Individual components“</a:t>
+              <a:t>Potom, prošitiri odeljak „Individual components“ (u istom panelu)</a:t>
             </a:r>
           </a:p>
           <a:p>
             <a:r>
               <a:rPr lang="sr-Latn-RS" dirty="0"/>
-              <a:t>Odabrati opcije:</a:t>
+              <a:t>Odabrati opcije (ukoliko nisu):</a:t>
             </a:r>
           </a:p>
           <a:p>
@@ -13808,6 +17178,10 @@
             </a:r>
           </a:p>
           <a:p>
+            <a:r>
+              <a:rPr lang="sr-Latn-RS" dirty="0"/>
+              <a:t>Zatim, u tabu „Individual Components“ (dakle, ne u panelu), osigurati da je opcija „.NET 6.0 Runtime (LTS)“ odabrana</a:t>
+            </a:r>
             <a:endParaRPr lang="en-US" dirty="0"/>
           </a:p>
         </p:txBody>

</xml_diff>